<commit_message>
Updated Day 6 supporting Materials
</commit_message>
<xml_diff>
--- a/Day 2/Slides/6. Understanding Methods/understanding-methods-slides.pptx
+++ b/Day 2/Slides/6. Understanding Methods/understanding-methods-slides.pptx
@@ -5,33 +5,33 @@
     <p:sldMasterId id="2147483648" r:id="rId1"/>
   </p:sldMasterIdLst>
   <p:notesMasterIdLst>
-    <p:notesMasterId r:id="rId27"/>
+    <p:notesMasterId r:id="rId26"/>
   </p:notesMasterIdLst>
   <p:sldIdLst>
-    <p:sldId id="256" r:id="rId3"/>
-    <p:sldId id="257" r:id="rId4"/>
-    <p:sldId id="258" r:id="rId5"/>
-    <p:sldId id="259" r:id="rId6"/>
-    <p:sldId id="260" r:id="rId7"/>
-    <p:sldId id="261" r:id="rId8"/>
-    <p:sldId id="262" r:id="rId9"/>
-    <p:sldId id="263" r:id="rId10"/>
-    <p:sldId id="264" r:id="rId11"/>
-    <p:sldId id="265" r:id="rId12"/>
-    <p:sldId id="266" r:id="rId13"/>
-    <p:sldId id="267" r:id="rId14"/>
-    <p:sldId id="268" r:id="rId15"/>
-    <p:sldId id="269" r:id="rId16"/>
-    <p:sldId id="270" r:id="rId17"/>
-    <p:sldId id="271" r:id="rId18"/>
-    <p:sldId id="272" r:id="rId19"/>
-    <p:sldId id="273" r:id="rId20"/>
-    <p:sldId id="274" r:id="rId21"/>
-    <p:sldId id="275" r:id="rId22"/>
-    <p:sldId id="276" r:id="rId23"/>
-    <p:sldId id="277" r:id="rId24"/>
-    <p:sldId id="278" r:id="rId25"/>
-    <p:sldId id="279" r:id="rId26"/>
+    <p:sldId id="256" r:id="rId2"/>
+    <p:sldId id="257" r:id="rId3"/>
+    <p:sldId id="258" r:id="rId4"/>
+    <p:sldId id="259" r:id="rId5"/>
+    <p:sldId id="260" r:id="rId6"/>
+    <p:sldId id="261" r:id="rId7"/>
+    <p:sldId id="262" r:id="rId8"/>
+    <p:sldId id="263" r:id="rId9"/>
+    <p:sldId id="264" r:id="rId10"/>
+    <p:sldId id="265" r:id="rId11"/>
+    <p:sldId id="266" r:id="rId12"/>
+    <p:sldId id="267" r:id="rId13"/>
+    <p:sldId id="268" r:id="rId14"/>
+    <p:sldId id="269" r:id="rId15"/>
+    <p:sldId id="270" r:id="rId16"/>
+    <p:sldId id="271" r:id="rId17"/>
+    <p:sldId id="272" r:id="rId18"/>
+    <p:sldId id="273" r:id="rId19"/>
+    <p:sldId id="274" r:id="rId20"/>
+    <p:sldId id="275" r:id="rId21"/>
+    <p:sldId id="276" r:id="rId22"/>
+    <p:sldId id="277" r:id="rId23"/>
+    <p:sldId id="278" r:id="rId24"/>
+    <p:sldId id="279" r:id="rId25"/>
   </p:sldIdLst>
   <p:sldSz cx="12192000" cy="6858000"/>
   <p:notesSz cx="12192000" cy="6858000"/>
@@ -127,6 +127,22 @@
       </a:defRPr>
     </a:lvl9pPr>
   </p:defaultTextStyle>
+  <p:extLst>
+    <p:ext uri="{EFAFB233-063F-42B5-8137-9DF3F51BA10A}">
+      <p15:sldGuideLst xmlns:p15="http://schemas.microsoft.com/office/powerpoint/2012/main">
+        <p15:guide id="1" orient="horz" pos="2880">
+          <p15:clr>
+            <a:srgbClr val="A4A3A4"/>
+          </p15:clr>
+        </p15:guide>
+        <p15:guide id="2" pos="2160">
+          <p15:clr>
+            <a:srgbClr val="A4A3A4"/>
+          </p15:clr>
+        </p15:guide>
+      </p15:sldGuideLst>
+    </p:ext>
+  </p:extLst>
 </p:presentation>
 </file>
 
@@ -212,6 +228,7 @@
           <a:p>
             <a:fld id="{3EFD42F7-718C-4B98-AAEC-167E6DDD60A7}" type="datetimeFigureOut">
               <a:rPr lang="en-US" smtClean="0"/>
+              <a:t>8/6/2023</a:t>
             </a:fld>
             <a:endParaRPr lang="en-US"/>
           </a:p>
@@ -275,42 +292,37 @@
           <a:p>
             <a:pPr lvl="0"/>
             <a:r>
-              <a:rPr lang="en-US" smtClean="0"/>
+              <a:rPr lang="en-US"/>
               <a:t>Click to edit Master text styles</a:t>
             </a:r>
-            <a:endParaRPr lang="en-US" smtClean="0"/>
           </a:p>
           <a:p>
             <a:pPr lvl="1"/>
             <a:r>
-              <a:rPr lang="en-US" smtClean="0"/>
+              <a:rPr lang="en-US"/>
               <a:t>Second level</a:t>
             </a:r>
-            <a:endParaRPr lang="en-US" smtClean="0"/>
           </a:p>
           <a:p>
             <a:pPr lvl="2"/>
             <a:r>
-              <a:rPr lang="en-US" smtClean="0"/>
+              <a:rPr lang="en-US"/>
               <a:t>Third level</a:t>
             </a:r>
-            <a:endParaRPr lang="en-US" smtClean="0"/>
           </a:p>
           <a:p>
             <a:pPr lvl="3"/>
             <a:r>
-              <a:rPr lang="en-US" smtClean="0"/>
+              <a:rPr lang="en-US"/>
               <a:t>Fourth level</a:t>
             </a:r>
-            <a:endParaRPr lang="en-US" smtClean="0"/>
           </a:p>
           <a:p>
             <a:pPr lvl="4"/>
             <a:r>
-              <a:rPr lang="en-US" smtClean="0"/>
+              <a:rPr lang="en-US"/>
               <a:t>Fifth level</a:t>
             </a:r>
-            <a:endParaRPr lang="en-US"/>
           </a:p>
         </p:txBody>
       </p:sp>
@@ -374,6 +386,7 @@
           <a:p>
             <a:fld id="{21B2AA4F-B828-4D7C-AFD3-893933DAFCB4}" type="slidenum">
               <a:rPr lang="en-US" smtClean="0"/>
+              <a:t>‹#›</a:t>
             </a:fld>
             <a:endParaRPr lang="en-US"/>
           </a:p>
@@ -522,7 +535,9 @@
               <a:defRPr/>
             </a:lvl1pPr>
           </a:lstStyle>
-          <a:p/>
+          <a:p>
+            <a:endParaRPr/>
+          </a:p>
         </p:txBody>
       </p:sp>
       <p:sp>
@@ -553,7 +568,9 @@
               <a:defRPr/>
             </a:lvl1pPr>
           </a:lstStyle>
-          <a:p/>
+          <a:p>
+            <a:endParaRPr/>
+          </a:p>
         </p:txBody>
       </p:sp>
       <p:sp>
@@ -580,7 +597,9 @@
               </a:defRPr>
             </a:lvl1pPr>
           </a:lstStyle>
-          <a:p/>
+          <a:p>
+            <a:endParaRPr/>
+          </a:p>
         </p:txBody>
       </p:sp>
       <p:sp>
@@ -610,6 +629,7 @@
           <a:p>
             <a:fld id="{1D8BD707-D9CF-40AE-B4C6-C98DA3205C09}" type="datetimeFigureOut">
               <a:rPr lang="en-US"/>
+              <a:t>8/6/2023</a:t>
             </a:fld>
             <a:endParaRPr lang="en-US"/>
           </a:p>
@@ -642,6 +662,7 @@
           <a:p>
             <a:fld id="{B6F15528-21DE-4FAA-801E-634DDDAF4B2B}" type="slidenum">
               <a:rPr/>
+              <a:t>‹#›</a:t>
             </a:fld>
             <a:endParaRPr/>
           </a:p>
@@ -657,7 +678,7 @@
 </file>
 
 <file path=ppt/slideLayouts/slideLayout2.xml><?xml version="1.0" encoding="utf-8"?>
-<p:sldLayout xmlns:a="http://schemas.openxmlformats.org/drawingml/2006/main" xmlns:r="http://schemas.openxmlformats.org/officeDocument/2006/relationships" xmlns:p="http://schemas.openxmlformats.org/presentationml/2006/main" type="obj" preserve="1" showMasterSp="0">
+<p:sldLayout xmlns:a="http://schemas.openxmlformats.org/drawingml/2006/main" xmlns:r="http://schemas.openxmlformats.org/officeDocument/2006/relationships" xmlns:p="http://schemas.openxmlformats.org/presentationml/2006/main" showMasterSp="0" type="obj" preserve="1">
   <p:cSld name="Title and Content">
     <p:bg>
       <p:bgPr>
@@ -726,7 +747,9 @@
         <p:txBody>
           <a:bodyPr wrap="square" lIns="0" tIns="0" rIns="0" bIns="0" rtlCol="0"/>
           <a:lstStyle/>
-          <a:p/>
+          <a:p>
+            <a:endParaRPr/>
+          </a:p>
         </p:txBody>
       </p:sp>
       <p:sp>
@@ -753,7 +776,9 @@
               </a:defRPr>
             </a:lvl1pPr>
           </a:lstStyle>
-          <a:p/>
+          <a:p>
+            <a:endParaRPr/>
+          </a:p>
         </p:txBody>
       </p:sp>
       <p:sp>
@@ -778,7 +803,9 @@
               </a:defRPr>
             </a:lvl1pPr>
           </a:lstStyle>
-          <a:p/>
+          <a:p>
+            <a:endParaRPr/>
+          </a:p>
         </p:txBody>
       </p:sp>
       <p:sp>
@@ -805,7 +832,9 @@
               </a:defRPr>
             </a:lvl1pPr>
           </a:lstStyle>
-          <a:p/>
+          <a:p>
+            <a:endParaRPr/>
+          </a:p>
         </p:txBody>
       </p:sp>
       <p:sp>
@@ -835,6 +864,7 @@
           <a:p>
             <a:fld id="{1D8BD707-D9CF-40AE-B4C6-C98DA3205C09}" type="datetimeFigureOut">
               <a:rPr lang="en-US"/>
+              <a:t>8/6/2023</a:t>
             </a:fld>
             <a:endParaRPr lang="en-US"/>
           </a:p>
@@ -867,6 +897,7 @@
           <a:p>
             <a:fld id="{B6F15528-21DE-4FAA-801E-634DDDAF4B2B}" type="slidenum">
               <a:rPr/>
+              <a:t>‹#›</a:t>
             </a:fld>
             <a:endParaRPr/>
           </a:p>
@@ -922,7 +953,9 @@
               </a:defRPr>
             </a:lvl1pPr>
           </a:lstStyle>
-          <a:p/>
+          <a:p>
+            <a:endParaRPr/>
+          </a:p>
         </p:txBody>
       </p:sp>
       <p:sp>
@@ -953,7 +986,9 @@
               <a:defRPr/>
             </a:lvl1pPr>
           </a:lstStyle>
-          <a:p/>
+          <a:p>
+            <a:endParaRPr/>
+          </a:p>
         </p:txBody>
       </p:sp>
       <p:sp>
@@ -984,7 +1019,9 @@
               <a:defRPr/>
             </a:lvl1pPr>
           </a:lstStyle>
-          <a:p/>
+          <a:p>
+            <a:endParaRPr/>
+          </a:p>
         </p:txBody>
       </p:sp>
       <p:sp>
@@ -1011,7 +1048,9 @@
               </a:defRPr>
             </a:lvl1pPr>
           </a:lstStyle>
-          <a:p/>
+          <a:p>
+            <a:endParaRPr/>
+          </a:p>
         </p:txBody>
       </p:sp>
       <p:sp>
@@ -1041,6 +1080,7 @@
           <a:p>
             <a:fld id="{1D8BD707-D9CF-40AE-B4C6-C98DA3205C09}" type="datetimeFigureOut">
               <a:rPr lang="en-US"/>
+              <a:t>8/6/2023</a:t>
             </a:fld>
             <a:endParaRPr lang="en-US"/>
           </a:p>
@@ -1073,6 +1113,7 @@
           <a:p>
             <a:fld id="{B6F15528-21DE-4FAA-801E-634DDDAF4B2B}" type="slidenum">
               <a:rPr/>
+              <a:t>‹#›</a:t>
             </a:fld>
             <a:endParaRPr/>
           </a:p>
@@ -1128,7 +1169,9 @@
               </a:defRPr>
             </a:lvl1pPr>
           </a:lstStyle>
-          <a:p/>
+          <a:p>
+            <a:endParaRPr/>
+          </a:p>
         </p:txBody>
       </p:sp>
       <p:sp>
@@ -1155,7 +1198,9 @@
               </a:defRPr>
             </a:lvl1pPr>
           </a:lstStyle>
-          <a:p/>
+          <a:p>
+            <a:endParaRPr/>
+          </a:p>
         </p:txBody>
       </p:sp>
       <p:sp>
@@ -1185,6 +1230,7 @@
           <a:p>
             <a:fld id="{1D8BD707-D9CF-40AE-B4C6-C98DA3205C09}" type="datetimeFigureOut">
               <a:rPr lang="en-US"/>
+              <a:t>8/6/2023</a:t>
             </a:fld>
             <a:endParaRPr lang="en-US"/>
           </a:p>
@@ -1217,6 +1263,7 @@
           <a:p>
             <a:fld id="{B6F15528-21DE-4FAA-801E-634DDDAF4B2B}" type="slidenum">
               <a:rPr/>
+              <a:t>‹#›</a:t>
             </a:fld>
             <a:endParaRPr/>
           </a:p>
@@ -1272,7 +1319,9 @@
               </a:defRPr>
             </a:lvl1pPr>
           </a:lstStyle>
-          <a:p/>
+          <a:p>
+            <a:endParaRPr/>
+          </a:p>
         </p:txBody>
       </p:sp>
       <p:sp>
@@ -1302,6 +1351,7 @@
           <a:p>
             <a:fld id="{1D8BD707-D9CF-40AE-B4C6-C98DA3205C09}" type="datetimeFigureOut">
               <a:rPr lang="en-US"/>
+              <a:t>8/6/2023</a:t>
             </a:fld>
             <a:endParaRPr lang="en-US"/>
           </a:p>
@@ -1334,6 +1384,7 @@
           <a:p>
             <a:fld id="{B6F15528-21DE-4FAA-801E-634DDDAF4B2B}" type="slidenum">
               <a:rPr/>
+              <a:t>‹#›</a:t>
             </a:fld>
             <a:endParaRPr/>
           </a:p>
@@ -1407,7 +1458,9 @@
               </a:defRPr>
             </a:lvl1pPr>
           </a:lstStyle>
-          <a:p/>
+          <a:p>
+            <a:endParaRPr/>
+          </a:p>
         </p:txBody>
       </p:sp>
       <p:sp>
@@ -1442,7 +1495,9 @@
               </a:defRPr>
             </a:lvl1pPr>
           </a:lstStyle>
-          <a:p/>
+          <a:p>
+            <a:endParaRPr/>
+          </a:p>
         </p:txBody>
       </p:sp>
       <p:sp>
@@ -1479,7 +1534,9 @@
               </a:defRPr>
             </a:lvl1pPr>
           </a:lstStyle>
-          <a:p/>
+          <a:p>
+            <a:endParaRPr/>
+          </a:p>
         </p:txBody>
       </p:sp>
       <p:sp>
@@ -1519,6 +1576,7 @@
           <a:p>
             <a:fld id="{1D8BD707-D9CF-40AE-B4C6-C98DA3205C09}" type="datetimeFigureOut">
               <a:rPr lang="en-US"/>
+              <a:t>8/6/2023</a:t>
             </a:fld>
             <a:endParaRPr lang="en-US"/>
           </a:p>
@@ -1561,6 +1619,7 @@
           <a:p>
             <a:fld id="{B6F15528-21DE-4FAA-801E-634DDDAF4B2B}" type="slidenum">
               <a:rPr/>
+              <a:t>‹#›</a:t>
             </a:fld>
             <a:endParaRPr/>
           </a:p>
@@ -1745,7 +1804,7 @@
           <p:nvPr/>
         </p:nvPicPr>
         <p:blipFill>
-          <a:blip r:embed="rId1" cstate="print"/>
+          <a:blip r:embed="rId2" cstate="print"/>
           <a:stretch>
             <a:fillRect/>
           </a:stretch>
@@ -1767,7 +1826,7 @@
           <p:nvPr/>
         </p:nvPicPr>
         <p:blipFill>
-          <a:blip r:embed="rId2" cstate="print"/>
+          <a:blip r:embed="rId3" cstate="print"/>
           <a:stretch>
             <a:fillRect/>
           </a:stretch>
@@ -1795,9 +1854,11 @@
         <p:spPr/>
         <p:txBody>
           <a:bodyPr/>
+          <a:lstStyle/>
           <a:p>
             <a:fld id="{B6F15528-21DE-4FAA-801E-634DDDAF4B2B}" type="slidenum">
               <a:rPr/>
+              <a:t>1</a:t>
             </a:fld>
             <a:endParaRPr/>
           </a:p>
@@ -1873,7 +1934,9 @@
         <p:txBody>
           <a:bodyPr wrap="square" lIns="0" tIns="0" rIns="0" bIns="0" rtlCol="0"/>
           <a:lstStyle/>
-          <a:p/>
+          <a:p>
+            <a:endParaRPr/>
+          </a:p>
         </p:txBody>
       </p:sp>
       <p:pic>
@@ -1883,7 +1946,7 @@
           <p:nvPr/>
         </p:nvPicPr>
         <p:blipFill>
-          <a:blip r:embed="rId1" cstate="print"/>
+          <a:blip r:embed="rId2" cstate="print"/>
           <a:stretch>
             <a:fillRect/>
           </a:stretch>
@@ -1955,7 +2018,9 @@
         <p:txBody>
           <a:bodyPr wrap="square" lIns="0" tIns="0" rIns="0" bIns="0" rtlCol="0"/>
           <a:lstStyle/>
-          <a:p/>
+          <a:p>
+            <a:endParaRPr/>
+          </a:p>
         </p:txBody>
       </p:sp>
       <p:sp>
@@ -2015,7 +2080,9 @@
         <p:txBody>
           <a:bodyPr wrap="square" lIns="0" tIns="0" rIns="0" bIns="0" rtlCol="0"/>
           <a:lstStyle/>
-          <a:p/>
+          <a:p>
+            <a:endParaRPr/>
+          </a:p>
         </p:txBody>
       </p:sp>
       <p:sp>
@@ -3053,7 +3120,7 @@
           <p:nvPr/>
         </p:nvPicPr>
         <p:blipFill>
-          <a:blip r:embed="rId2" cstate="print"/>
+          <a:blip r:embed="rId3" cstate="print"/>
           <a:stretch>
             <a:fillRect/>
           </a:stretch>
@@ -3075,7 +3142,7 @@
           <p:nvPr/>
         </p:nvPicPr>
         <p:blipFill>
-          <a:blip r:embed="rId3" cstate="print"/>
+          <a:blip r:embed="rId4" cstate="print"/>
           <a:stretch>
             <a:fillRect/>
           </a:stretch>
@@ -3097,7 +3164,7 @@
           <p:nvPr/>
         </p:nvPicPr>
         <p:blipFill>
-          <a:blip r:embed="rId3" cstate="print"/>
+          <a:blip r:embed="rId4" cstate="print"/>
           <a:stretch>
             <a:fillRect/>
           </a:stretch>
@@ -3505,9 +3572,11 @@
         <p:spPr/>
         <p:txBody>
           <a:bodyPr/>
+          <a:lstStyle/>
           <a:p>
             <a:fld id="{B6F15528-21DE-4FAA-801E-634DDDAF4B2B}" type="slidenum">
               <a:rPr/>
+              <a:t>10</a:t>
             </a:fld>
             <a:endParaRPr/>
           </a:p>
@@ -3545,28 +3614,6 @@
           <p:nvPr/>
         </p:nvPicPr>
         <p:blipFill>
-          <a:blip r:embed="rId1" cstate="print"/>
-          <a:stretch>
-            <a:fillRect/>
-          </a:stretch>
-        </p:blipFill>
-        <p:spPr>
-          <a:xfrm>
-            <a:off x="1152429" y="1870006"/>
-            <a:ext cx="2397092" cy="2360558"/>
-          </a:xfrm>
-          <a:prstGeom prst="rect">
-            <a:avLst/>
-          </a:prstGeom>
-        </p:spPr>
-      </p:pic>
-      <p:pic>
-        <p:nvPicPr>
-          <p:cNvPr id="3" name="object 3"/>
-          <p:cNvPicPr/>
-          <p:nvPr/>
-        </p:nvPicPr>
-        <p:blipFill>
           <a:blip r:embed="rId2" cstate="print"/>
           <a:stretch>
             <a:fillRect/>
@@ -3574,8 +3621,8 @@
         </p:blipFill>
         <p:spPr>
           <a:xfrm>
-            <a:off x="4924510" y="1887160"/>
-            <a:ext cx="2334203" cy="2315955"/>
+            <a:off x="1152429" y="1870006"/>
+            <a:ext cx="2397092" cy="2360558"/>
           </a:xfrm>
           <a:prstGeom prst="rect">
             <a:avLst/>
@@ -3584,7 +3631,7 @@
       </p:pic>
       <p:pic>
         <p:nvPicPr>
-          <p:cNvPr id="4" name="object 4"/>
+          <p:cNvPr id="3" name="object 3"/>
           <p:cNvPicPr/>
           <p:nvPr/>
         </p:nvPicPr>
@@ -3596,8 +3643,8 @@
         </p:blipFill>
         <p:spPr>
           <a:xfrm>
-            <a:off x="8612813" y="1900712"/>
-            <a:ext cx="2428269" cy="2297622"/>
+            <a:off x="4924510" y="1887160"/>
+            <a:ext cx="2334203" cy="2315955"/>
           </a:xfrm>
           <a:prstGeom prst="rect">
             <a:avLst/>
@@ -3606,7 +3653,7 @@
       </p:pic>
       <p:pic>
         <p:nvPicPr>
-          <p:cNvPr id="5" name="object 5"/>
+          <p:cNvPr id="4" name="object 4"/>
           <p:cNvPicPr/>
           <p:nvPr/>
         </p:nvPicPr>
@@ -3618,8 +3665,8 @@
         </p:blipFill>
         <p:spPr>
           <a:xfrm>
-            <a:off x="1400302" y="4569282"/>
-            <a:ext cx="2055114" cy="305104"/>
+            <a:off x="8612813" y="1900712"/>
+            <a:ext cx="2428269" cy="2297622"/>
           </a:xfrm>
           <a:prstGeom prst="rect">
             <a:avLst/>
@@ -3628,7 +3675,7 @@
       </p:pic>
       <p:pic>
         <p:nvPicPr>
-          <p:cNvPr id="6" name="object 6"/>
+          <p:cNvPr id="5" name="object 5"/>
           <p:cNvPicPr/>
           <p:nvPr/>
         </p:nvPicPr>
@@ -3640,8 +3687,8 @@
         </p:blipFill>
         <p:spPr>
           <a:xfrm>
-            <a:off x="920191" y="4950840"/>
-            <a:ext cx="2998851" cy="274319"/>
+            <a:off x="1400302" y="4569282"/>
+            <a:ext cx="2055114" cy="305104"/>
           </a:xfrm>
           <a:prstGeom prst="rect">
             <a:avLst/>
@@ -3650,7 +3697,7 @@
       </p:pic>
       <p:pic>
         <p:nvPicPr>
-          <p:cNvPr id="7" name="object 7"/>
+          <p:cNvPr id="6" name="object 6"/>
           <p:cNvPicPr/>
           <p:nvPr/>
         </p:nvPicPr>
@@ -3662,8 +3709,8 @@
         </p:blipFill>
         <p:spPr>
           <a:xfrm>
-            <a:off x="3369817" y="549859"/>
-            <a:ext cx="5608955" cy="548944"/>
+            <a:off x="920191" y="4950840"/>
+            <a:ext cx="2998851" cy="274319"/>
           </a:xfrm>
           <a:prstGeom prst="rect">
             <a:avLst/>
@@ -3672,7 +3719,7 @@
       </p:pic>
       <p:pic>
         <p:nvPicPr>
-          <p:cNvPr id="8" name="object 8"/>
+          <p:cNvPr id="7" name="object 7"/>
           <p:cNvPicPr/>
           <p:nvPr/>
         </p:nvPicPr>
@@ -3684,8 +3731,8 @@
         </p:blipFill>
         <p:spPr>
           <a:xfrm>
-            <a:off x="4992878" y="4569282"/>
-            <a:ext cx="2364485" cy="305104"/>
+            <a:off x="3369817" y="549859"/>
+            <a:ext cx="5608955" cy="548944"/>
           </a:xfrm>
           <a:prstGeom prst="rect">
             <a:avLst/>
@@ -3694,7 +3741,7 @@
       </p:pic>
       <p:pic>
         <p:nvPicPr>
-          <p:cNvPr id="9" name="object 9"/>
+          <p:cNvPr id="8" name="object 8"/>
           <p:cNvPicPr/>
           <p:nvPr/>
         </p:nvPicPr>
@@ -3706,8 +3753,8 @@
         </p:blipFill>
         <p:spPr>
           <a:xfrm>
-            <a:off x="4849621" y="4950840"/>
-            <a:ext cx="2625979" cy="274319"/>
+            <a:off x="4992878" y="4569282"/>
+            <a:ext cx="2364485" cy="305104"/>
           </a:xfrm>
           <a:prstGeom prst="rect">
             <a:avLst/>
@@ -3716,7 +3763,7 @@
       </p:pic>
       <p:pic>
         <p:nvPicPr>
-          <p:cNvPr id="10" name="object 10"/>
+          <p:cNvPr id="9" name="object 9"/>
           <p:cNvPicPr/>
           <p:nvPr/>
         </p:nvPicPr>
@@ -3728,8 +3775,8 @@
         </p:blipFill>
         <p:spPr>
           <a:xfrm>
-            <a:off x="9046209" y="4569282"/>
-            <a:ext cx="1699259" cy="305104"/>
+            <a:off x="4849621" y="4950840"/>
+            <a:ext cx="2625979" cy="274319"/>
           </a:xfrm>
           <a:prstGeom prst="rect">
             <a:avLst/>
@@ -3738,7 +3785,7 @@
       </p:pic>
       <p:pic>
         <p:nvPicPr>
-          <p:cNvPr id="11" name="object 11"/>
+          <p:cNvPr id="10" name="object 10"/>
           <p:cNvPicPr/>
           <p:nvPr/>
         </p:nvPicPr>
@@ -3750,6 +3797,28 @@
         </p:blipFill>
         <p:spPr>
           <a:xfrm>
+            <a:off x="9046209" y="4569282"/>
+            <a:ext cx="1699259" cy="305104"/>
+          </a:xfrm>
+          <a:prstGeom prst="rect">
+            <a:avLst/>
+          </a:prstGeom>
+        </p:spPr>
+      </p:pic>
+      <p:pic>
+        <p:nvPicPr>
+          <p:cNvPr id="11" name="object 11"/>
+          <p:cNvPicPr/>
+          <p:nvPr/>
+        </p:nvPicPr>
+        <p:blipFill>
+          <a:blip r:embed="rId11" cstate="print"/>
+          <a:stretch>
+            <a:fillRect/>
+          </a:stretch>
+        </p:blipFill>
+        <p:spPr>
+          <a:xfrm>
             <a:off x="8570721" y="4950840"/>
             <a:ext cx="2639441" cy="274319"/>
           </a:xfrm>
@@ -3765,7 +3834,7 @@
           <p:nvPr/>
         </p:nvPicPr>
         <p:blipFill>
-          <a:blip r:embed="rId11" cstate="print"/>
+          <a:blip r:embed="rId12" cstate="print"/>
           <a:stretch>
             <a:fillRect/>
           </a:stretch>
@@ -3793,9 +3862,11 @@
         <p:spPr/>
         <p:txBody>
           <a:bodyPr/>
+          <a:lstStyle/>
           <a:p>
             <a:fld id="{B6F15528-21DE-4FAA-801E-634DDDAF4B2B}" type="slidenum">
               <a:rPr/>
+              <a:t>11</a:t>
             </a:fld>
             <a:endParaRPr/>
           </a:p>
@@ -4292,7 +4363,7 @@
           <p:nvPr/>
         </p:nvPicPr>
         <p:blipFill>
-          <a:blip r:embed="rId1" cstate="print"/>
+          <a:blip r:embed="rId2" cstate="print"/>
           <a:stretch>
             <a:fillRect/>
           </a:stretch>
@@ -4354,7 +4425,9 @@
         <p:txBody>
           <a:bodyPr wrap="square" lIns="0" tIns="0" rIns="0" bIns="0" rtlCol="0"/>
           <a:lstStyle/>
-          <a:p/>
+          <a:p>
+            <a:endParaRPr/>
+          </a:p>
         </p:txBody>
       </p:sp>
       <p:sp>
@@ -4404,7 +4477,9 @@
         <p:txBody>
           <a:bodyPr wrap="square" lIns="0" tIns="0" rIns="0" bIns="0" rtlCol="0"/>
           <a:lstStyle/>
-          <a:p/>
+          <a:p>
+            <a:endParaRPr/>
+          </a:p>
         </p:txBody>
       </p:sp>
       <p:sp>
@@ -4454,7 +4529,9 @@
         <p:txBody>
           <a:bodyPr wrap="square" lIns="0" tIns="0" rIns="0" bIns="0" rtlCol="0"/>
           <a:lstStyle/>
-          <a:p/>
+          <a:p>
+            <a:endParaRPr/>
+          </a:p>
         </p:txBody>
       </p:sp>
       <p:grpSp>
@@ -4525,7 +4602,9 @@
           <p:txBody>
             <a:bodyPr wrap="square" lIns="0" tIns="0" rIns="0" bIns="0" rtlCol="0"/>
             <a:lstStyle/>
-            <a:p/>
+            <a:p>
+              <a:endParaRPr/>
+            </a:p>
           </p:txBody>
         </p:sp>
         <p:sp>
@@ -4593,7 +4672,9 @@
           <p:txBody>
             <a:bodyPr wrap="square" lIns="0" tIns="0" rIns="0" bIns="0" rtlCol="0"/>
             <a:lstStyle/>
-            <a:p/>
+            <a:p>
+              <a:endParaRPr/>
+            </a:p>
           </p:txBody>
         </p:sp>
       </p:grpSp>
@@ -4610,9 +4691,11 @@
         <p:spPr/>
         <p:txBody>
           <a:bodyPr/>
+          <a:lstStyle/>
           <a:p>
             <a:fld id="{B6F15528-21DE-4FAA-801E-634DDDAF4B2B}" type="slidenum">
               <a:rPr/>
+              <a:t>12</a:t>
             </a:fld>
             <a:endParaRPr/>
           </a:p>
@@ -5036,7 +5119,7 @@
         </p:nvGraphicFramePr>
         <p:xfrm>
           <a:off x="851916" y="4401311"/>
-          <a:ext cx="4919980" cy="1066800"/>
+          <a:ext cx="4882515" cy="1040891"/>
         </p:xfrm>
         <a:graphic>
           <a:graphicData uri="http://schemas.openxmlformats.org/drawingml/2006/table">
@@ -5045,11 +5128,41 @@
                 <a:tableStyleId>{2D5ABB26-0587-4C30-8999-92F81FD0307C}</a:tableStyleId>
               </a:tblPr>
               <a:tblGrid>
-                <a:gridCol w="712470"/>
-                <a:gridCol w="1553845"/>
-                <a:gridCol w="226060"/>
-                <a:gridCol w="1434465"/>
-                <a:gridCol w="955675"/>
+                <a:gridCol w="712470">
+                  <a:extLst>
+                    <a:ext uri="{9D8B030D-6E8A-4147-A177-3AD203B41FA5}">
+                      <a16:colId xmlns:a16="http://schemas.microsoft.com/office/drawing/2014/main" val="20000"/>
+                    </a:ext>
+                  </a:extLst>
+                </a:gridCol>
+                <a:gridCol w="1553845">
+                  <a:extLst>
+                    <a:ext uri="{9D8B030D-6E8A-4147-A177-3AD203B41FA5}">
+                      <a16:colId xmlns:a16="http://schemas.microsoft.com/office/drawing/2014/main" val="20001"/>
+                    </a:ext>
+                  </a:extLst>
+                </a:gridCol>
+                <a:gridCol w="226060">
+                  <a:extLst>
+                    <a:ext uri="{9D8B030D-6E8A-4147-A177-3AD203B41FA5}">
+                      <a16:colId xmlns:a16="http://schemas.microsoft.com/office/drawing/2014/main" val="20002"/>
+                    </a:ext>
+                  </a:extLst>
+                </a:gridCol>
+                <a:gridCol w="1434465">
+                  <a:extLst>
+                    <a:ext uri="{9D8B030D-6E8A-4147-A177-3AD203B41FA5}">
+                      <a16:colId xmlns:a16="http://schemas.microsoft.com/office/drawing/2014/main" val="20003"/>
+                    </a:ext>
+                  </a:extLst>
+                </a:gridCol>
+                <a:gridCol w="955675">
+                  <a:extLst>
+                    <a:ext uri="{9D8B030D-6E8A-4147-A177-3AD203B41FA5}">
+                      <a16:colId xmlns:a16="http://schemas.microsoft.com/office/drawing/2014/main" val="20004"/>
+                    </a:ext>
+                  </a:extLst>
+                </a:gridCol>
               </a:tblGrid>
               <a:tr h="413003">
                 <a:tc>
@@ -5456,6 +5569,11 @@
                     </a:solidFill>
                   </a:tcPr>
                 </a:tc>
+                <a:extLst>
+                  <a:ext uri="{0D108BD9-81ED-4DB2-BD59-A6C34878D82A}">
+                    <a16:rowId xmlns:a16="http://schemas.microsoft.com/office/drawing/2014/main" val="10000"/>
+                  </a:ext>
+                </a:extLst>
               </a:tr>
               <a:tr h="627888">
                 <a:tc gridSpan="5">
@@ -5512,17 +5630,50 @@
                   </a:tcPr>
                 </a:tc>
                 <a:tc hMerge="1">
+                  <a:txBody>
+                    <a:bodyPr/>
+                    <a:lstStyle/>
+                    <a:p>
+                      <a:endParaRPr lang="en-US"/>
+                    </a:p>
+                  </a:txBody>
                   <a:tcPr marL="0" marR="0" marT="0" marB="0"/>
                 </a:tc>
                 <a:tc hMerge="1">
+                  <a:txBody>
+                    <a:bodyPr/>
+                    <a:lstStyle/>
+                    <a:p>
+                      <a:endParaRPr lang="en-US"/>
+                    </a:p>
+                  </a:txBody>
                   <a:tcPr marL="0" marR="0" marT="0" marB="0"/>
                 </a:tc>
                 <a:tc hMerge="1">
+                  <a:txBody>
+                    <a:bodyPr/>
+                    <a:lstStyle/>
+                    <a:p>
+                      <a:endParaRPr lang="en-US"/>
+                    </a:p>
+                  </a:txBody>
                   <a:tcPr marL="0" marR="0" marT="0" marB="0"/>
                 </a:tc>
                 <a:tc hMerge="1">
+                  <a:txBody>
+                    <a:bodyPr/>
+                    <a:lstStyle/>
+                    <a:p>
+                      <a:endParaRPr lang="en-US"/>
+                    </a:p>
+                  </a:txBody>
                   <a:tcPr marL="0" marR="0" marT="0" marB="0"/>
                 </a:tc>
+                <a:extLst>
+                  <a:ext uri="{0D108BD9-81ED-4DB2-BD59-A6C34878D82A}">
+                    <a16:rowId xmlns:a16="http://schemas.microsoft.com/office/drawing/2014/main" val="10001"/>
+                  </a:ext>
+                </a:extLst>
               </a:tr>
             </a:tbl>
           </a:graphicData>
@@ -5615,7 +5766,7 @@
           <p:nvPr/>
         </p:nvPicPr>
         <p:blipFill>
-          <a:blip r:embed="rId1" cstate="print"/>
+          <a:blip r:embed="rId2" cstate="print"/>
           <a:stretch>
             <a:fillRect/>
           </a:stretch>
@@ -5677,7 +5828,9 @@
         <p:txBody>
           <a:bodyPr wrap="square" lIns="0" tIns="0" rIns="0" bIns="0" rtlCol="0"/>
           <a:lstStyle/>
-          <a:p/>
+          <a:p>
+            <a:endParaRPr/>
+          </a:p>
         </p:txBody>
       </p:sp>
       <p:sp>
@@ -5727,7 +5880,9 @@
         <p:txBody>
           <a:bodyPr wrap="square" lIns="0" tIns="0" rIns="0" bIns="0" rtlCol="0"/>
           <a:lstStyle/>
-          <a:p/>
+          <a:p>
+            <a:endParaRPr/>
+          </a:p>
         </p:txBody>
       </p:sp>
       <p:grpSp>
@@ -5798,7 +5953,9 @@
           <p:txBody>
             <a:bodyPr wrap="square" lIns="0" tIns="0" rIns="0" bIns="0" rtlCol="0"/>
             <a:lstStyle/>
-            <a:p/>
+            <a:p>
+              <a:endParaRPr/>
+            </a:p>
           </p:txBody>
         </p:sp>
         <p:sp>
@@ -5866,7 +6023,9 @@
           <p:txBody>
             <a:bodyPr wrap="square" lIns="0" tIns="0" rIns="0" bIns="0" rtlCol="0"/>
             <a:lstStyle/>
-            <a:p/>
+            <a:p>
+              <a:endParaRPr/>
+            </a:p>
           </p:txBody>
         </p:sp>
       </p:grpSp>
@@ -5883,9 +6042,11 @@
         <p:spPr/>
         <p:txBody>
           <a:bodyPr/>
+          <a:lstStyle/>
           <a:p>
             <a:fld id="{B6F15528-21DE-4FAA-801E-634DDDAF4B2B}" type="slidenum">
               <a:rPr/>
+              <a:t>13</a:t>
             </a:fld>
             <a:endParaRPr/>
           </a:p>
@@ -5961,7 +6122,9 @@
         <p:txBody>
           <a:bodyPr wrap="square" lIns="0" tIns="0" rIns="0" bIns="0" rtlCol="0"/>
           <a:lstStyle/>
-          <a:p/>
+          <a:p>
+            <a:endParaRPr/>
+          </a:p>
         </p:txBody>
       </p:sp>
       <p:sp>
@@ -6775,7 +6938,7 @@
           <p:nvPr/>
         </p:nvPicPr>
         <p:blipFill>
-          <a:blip r:embed="rId1" cstate="print"/>
+          <a:blip r:embed="rId2" cstate="print"/>
           <a:stretch>
             <a:fillRect/>
           </a:stretch>
@@ -6837,7 +7000,9 @@
         <p:txBody>
           <a:bodyPr wrap="square" lIns="0" tIns="0" rIns="0" bIns="0" rtlCol="0"/>
           <a:lstStyle/>
-          <a:p/>
+          <a:p>
+            <a:endParaRPr/>
+          </a:p>
         </p:txBody>
       </p:sp>
       <p:sp>
@@ -6905,7 +7070,9 @@
         <p:txBody>
           <a:bodyPr wrap="square" lIns="0" tIns="0" rIns="0" bIns="0" rtlCol="0"/>
           <a:lstStyle/>
-          <a:p/>
+          <a:p>
+            <a:endParaRPr/>
+          </a:p>
         </p:txBody>
       </p:sp>
       <p:sp>
@@ -6921,9 +7088,11 @@
         <p:spPr/>
         <p:txBody>
           <a:bodyPr/>
+          <a:lstStyle/>
           <a:p>
             <a:fld id="{B6F15528-21DE-4FAA-801E-634DDDAF4B2B}" type="slidenum">
               <a:rPr/>
+              <a:t>14</a:t>
             </a:fld>
             <a:endParaRPr/>
           </a:p>
@@ -6991,7 +7160,9 @@
         <p:txBody>
           <a:bodyPr wrap="square" lIns="0" tIns="0" rIns="0" bIns="0" rtlCol="0"/>
           <a:lstStyle/>
-          <a:p/>
+          <a:p>
+            <a:endParaRPr/>
+          </a:p>
         </p:txBody>
       </p:sp>
       <p:pic>
@@ -7001,7 +7172,7 @@
           <p:nvPr/>
         </p:nvPicPr>
         <p:blipFill>
-          <a:blip r:embed="rId1" cstate="print"/>
+          <a:blip r:embed="rId2" cstate="print"/>
           <a:stretch>
             <a:fillRect/>
           </a:stretch>
@@ -7023,7 +7194,7 @@
           <p:nvPr/>
         </p:nvPicPr>
         <p:blipFill>
-          <a:blip r:embed="rId2" cstate="print"/>
+          <a:blip r:embed="rId3" cstate="print"/>
           <a:stretch>
             <a:fillRect/>
           </a:stretch>
@@ -7091,7 +7262,7 @@
           <p:nvPr/>
         </p:nvPicPr>
         <p:blipFill>
-          <a:blip r:embed="rId3" cstate="print"/>
+          <a:blip r:embed="rId4" cstate="print"/>
           <a:stretch>
             <a:fillRect/>
           </a:stretch>
@@ -7113,7 +7284,7 @@
           <p:nvPr/>
         </p:nvPicPr>
         <p:blipFill>
-          <a:blip r:embed="rId4" cstate="print"/>
+          <a:blip r:embed="rId5" cstate="print"/>
           <a:stretch>
             <a:fillRect/>
           </a:stretch>
@@ -7205,7 +7376,7 @@
           <p:nvPr/>
         </p:nvPicPr>
         <p:blipFill>
-          <a:blip r:embed="rId5" cstate="print"/>
+          <a:blip r:embed="rId6" cstate="print"/>
           <a:stretch>
             <a:fillRect/>
           </a:stretch>
@@ -7241,7 +7412,7 @@
             <p:nvPr/>
           </p:nvPicPr>
           <p:blipFill>
-            <a:blip r:embed="rId6" cstate="print"/>
+            <a:blip r:embed="rId7" cstate="print"/>
             <a:stretch>
               <a:fillRect/>
             </a:stretch>
@@ -7263,7 +7434,7 @@
             <p:nvPr/>
           </p:nvPicPr>
           <p:blipFill>
-            <a:blip r:embed="rId7" cstate="print"/>
+            <a:blip r:embed="rId8" cstate="print"/>
             <a:stretch>
               <a:fillRect/>
             </a:stretch>
@@ -7286,7 +7457,7 @@
           <p:nvPr/>
         </p:nvPicPr>
         <p:blipFill>
-          <a:blip r:embed="rId8" cstate="print"/>
+          <a:blip r:embed="rId9" cstate="print"/>
           <a:stretch>
             <a:fillRect/>
           </a:stretch>
@@ -7314,9 +7485,11 @@
         <p:spPr/>
         <p:txBody>
           <a:bodyPr/>
+          <a:lstStyle/>
           <a:p>
             <a:fld id="{B6F15528-21DE-4FAA-801E-634DDDAF4B2B}" type="slidenum">
               <a:rPr/>
+              <a:t>15</a:t>
             </a:fld>
             <a:endParaRPr/>
           </a:p>
@@ -7392,7 +7565,9 @@
         <p:txBody>
           <a:bodyPr wrap="square" lIns="0" tIns="0" rIns="0" bIns="0" rtlCol="0"/>
           <a:lstStyle/>
-          <a:p/>
+          <a:p>
+            <a:endParaRPr/>
+          </a:p>
         </p:txBody>
       </p:sp>
       <p:sp>
@@ -7823,13 +7998,6 @@
               </a:rPr>
               <a:t>{ </a:t>
             </a:r>
-            <a:endParaRPr sz="2000" dirty="0">
-              <a:solidFill>
-                <a:srgbClr val="FFFFFF"/>
-              </a:solidFill>
-              <a:latin typeface="Courier New" panose="02070309020205020404"/>
-              <a:cs typeface="Courier New" panose="02070309020205020404"/>
-            </a:endParaRPr>
           </a:p>
           <a:p>
             <a:pPr marL="622300" marR="5080" indent="-609600">
@@ -8019,7 +8187,7 @@
           <p:nvPr/>
         </p:nvPicPr>
         <p:blipFill>
-          <a:blip r:embed="rId1" cstate="print"/>
+          <a:blip r:embed="rId2" cstate="print"/>
           <a:stretch>
             <a:fillRect/>
           </a:stretch>
@@ -8081,7 +8249,9 @@
         <p:txBody>
           <a:bodyPr wrap="square" lIns="0" tIns="0" rIns="0" bIns="0" rtlCol="0"/>
           <a:lstStyle/>
-          <a:p/>
+          <a:p>
+            <a:endParaRPr/>
+          </a:p>
         </p:txBody>
       </p:sp>
       <p:sp>
@@ -8131,7 +8301,9 @@
         <p:txBody>
           <a:bodyPr wrap="square" lIns="0" tIns="0" rIns="0" bIns="0" rtlCol="0"/>
           <a:lstStyle/>
-          <a:p/>
+          <a:p>
+            <a:endParaRPr/>
+          </a:p>
         </p:txBody>
       </p:sp>
       <p:sp>
@@ -8147,9 +8319,11 @@
         <p:spPr/>
         <p:txBody>
           <a:bodyPr/>
+          <a:lstStyle/>
           <a:p>
             <a:fld id="{B6F15528-21DE-4FAA-801E-634DDDAF4B2B}" type="slidenum">
               <a:rPr/>
+              <a:t>16</a:t>
             </a:fld>
             <a:endParaRPr/>
           </a:p>
@@ -8225,7 +8399,9 @@
         <p:txBody>
           <a:bodyPr wrap="square" lIns="0" tIns="0" rIns="0" bIns="0" rtlCol="0"/>
           <a:lstStyle/>
-          <a:p/>
+          <a:p>
+            <a:endParaRPr/>
+          </a:p>
         </p:txBody>
       </p:sp>
       <p:sp>
@@ -8377,7 +8553,7 @@
               </a:rPr>
               <a:t>10);</a:t>
             </a:r>
-            <a:endParaRPr sz="2000">
+            <a:endParaRPr sz="2000" dirty="0">
               <a:latin typeface="Courier New" panose="02070309020205020404"/>
               <a:cs typeface="Courier New" panose="02070309020205020404"/>
             </a:endParaRPr>
@@ -8451,7 +8627,7 @@
               </a:rPr>
               <a:t>50.0</a:t>
             </a:r>
-            <a:endParaRPr sz="2000">
+            <a:endParaRPr sz="2000" dirty="0">
               <a:latin typeface="Courier New" panose="02070309020205020404"/>
               <a:cs typeface="Courier New" panose="02070309020205020404"/>
             </a:endParaRPr>
@@ -8732,7 +8908,7 @@
               </a:rPr>
               <a:t>;</a:t>
             </a:r>
-            <a:endParaRPr sz="2000">
+            <a:endParaRPr sz="2000" dirty="0">
               <a:latin typeface="Courier New" panose="02070309020205020404"/>
               <a:cs typeface="Courier New" panose="02070309020205020404"/>
             </a:endParaRPr>
@@ -8756,7 +8932,7 @@
               </a:rPr>
               <a:t>}</a:t>
             </a:r>
-            <a:endParaRPr sz="2000">
+            <a:endParaRPr sz="2000" dirty="0">
               <a:latin typeface="Courier New" panose="02070309020205020404"/>
               <a:cs typeface="Courier New" panose="02070309020205020404"/>
             </a:endParaRPr>
@@ -8770,7 +8946,7 @@
           <p:nvPr/>
         </p:nvPicPr>
         <p:blipFill>
-          <a:blip r:embed="rId1" cstate="print"/>
+          <a:blip r:embed="rId2" cstate="print"/>
           <a:stretch>
             <a:fillRect/>
           </a:stretch>
@@ -8793,7 +8969,7 @@
         </p:nvSpPr>
         <p:spPr>
           <a:xfrm>
-            <a:off x="925830" y="4740402"/>
+            <a:off x="925830" y="4536441"/>
             <a:ext cx="5794375" cy="416559"/>
           </a:xfrm>
           <a:custGeom>
@@ -8832,7 +9008,9 @@
         <p:txBody>
           <a:bodyPr wrap="square" lIns="0" tIns="0" rIns="0" bIns="0" rtlCol="0"/>
           <a:lstStyle/>
-          <a:p/>
+          <a:p>
+            <a:endParaRPr/>
+          </a:p>
         </p:txBody>
       </p:sp>
       <p:sp>
@@ -8848,9 +9026,11 @@
         <p:spPr/>
         <p:txBody>
           <a:bodyPr/>
+          <a:lstStyle/>
           <a:p>
             <a:fld id="{B6F15528-21DE-4FAA-801E-634DDDAF4B2B}" type="slidenum">
               <a:rPr/>
+              <a:t>17</a:t>
             </a:fld>
             <a:endParaRPr/>
           </a:p>
@@ -8926,7 +9106,9 @@
         <p:txBody>
           <a:bodyPr wrap="square" lIns="0" tIns="0" rIns="0" bIns="0" rtlCol="0"/>
           <a:lstStyle/>
-          <a:p/>
+          <a:p>
+            <a:endParaRPr/>
+          </a:p>
         </p:txBody>
       </p:sp>
       <p:sp>
@@ -9714,7 +9896,7 @@
           <p:nvPr/>
         </p:nvPicPr>
         <p:blipFill>
-          <a:blip r:embed="rId1" cstate="print"/>
+          <a:blip r:embed="rId2" cstate="print"/>
           <a:stretch>
             <a:fillRect/>
           </a:stretch>
@@ -9742,9 +9924,11 @@
         <p:spPr/>
         <p:txBody>
           <a:bodyPr/>
+          <a:lstStyle/>
           <a:p>
             <a:fld id="{B6F15528-21DE-4FAA-801E-634DDDAF4B2B}" type="slidenum">
               <a:rPr/>
+              <a:t>18</a:t>
             </a:fld>
             <a:endParaRPr/>
           </a:p>
@@ -9782,7 +9966,7 @@
           <p:nvPr/>
         </p:nvPicPr>
         <p:blipFill>
-          <a:blip r:embed="rId1" cstate="print"/>
+          <a:blip r:embed="rId2" cstate="print"/>
           <a:stretch>
             <a:fillRect/>
           </a:stretch>
@@ -9804,7 +9988,7 @@
           <p:nvPr/>
         </p:nvPicPr>
         <p:blipFill>
-          <a:blip r:embed="rId2" cstate="print"/>
+          <a:blip r:embed="rId3" cstate="print"/>
           <a:stretch>
             <a:fillRect/>
           </a:stretch>
@@ -9826,7 +10010,7 @@
           <p:nvPr/>
         </p:nvPicPr>
         <p:blipFill>
-          <a:blip r:embed="rId3" cstate="print"/>
+          <a:blip r:embed="rId4" cstate="print"/>
           <a:stretch>
             <a:fillRect/>
           </a:stretch>
@@ -9862,7 +10046,7 @@
             <p:nvPr/>
           </p:nvPicPr>
           <p:blipFill>
-            <a:blip r:embed="rId4" cstate="print"/>
+            <a:blip r:embed="rId5" cstate="print"/>
             <a:stretch>
               <a:fillRect/>
             </a:stretch>
@@ -9884,7 +10068,7 @@
             <p:nvPr/>
           </p:nvPicPr>
           <p:blipFill>
-            <a:blip r:embed="rId5" cstate="print"/>
+            <a:blip r:embed="rId6" cstate="print"/>
             <a:stretch>
               <a:fillRect/>
             </a:stretch>
@@ -9906,7 +10090,7 @@
             <p:nvPr/>
           </p:nvPicPr>
           <p:blipFill>
-            <a:blip r:embed="rId6" cstate="print"/>
+            <a:blip r:embed="rId7" cstate="print"/>
             <a:stretch>
               <a:fillRect/>
             </a:stretch>
@@ -9929,7 +10113,7 @@
           <p:nvPr/>
         </p:nvPicPr>
         <p:blipFill>
-          <a:blip r:embed="rId7" cstate="print"/>
+          <a:blip r:embed="rId8" cstate="print"/>
           <a:stretch>
             <a:fillRect/>
           </a:stretch>
@@ -9965,7 +10149,7 @@
             <p:nvPr/>
           </p:nvPicPr>
           <p:blipFill>
-            <a:blip r:embed="rId8" cstate="print"/>
+            <a:blip r:embed="rId9" cstate="print"/>
             <a:stretch>
               <a:fillRect/>
             </a:stretch>
@@ -9987,7 +10171,7 @@
             <p:nvPr/>
           </p:nvPicPr>
           <p:blipFill>
-            <a:blip r:embed="rId9" cstate="print"/>
+            <a:blip r:embed="rId10" cstate="print"/>
             <a:stretch>
               <a:fillRect/>
             </a:stretch>
@@ -10009,7 +10193,7 @@
             <p:nvPr/>
           </p:nvPicPr>
           <p:blipFill>
-            <a:blip r:embed="rId10" cstate="print"/>
+            <a:blip r:embed="rId11" cstate="print"/>
             <a:stretch>
               <a:fillRect/>
             </a:stretch>
@@ -10032,7 +10216,7 @@
           <p:nvPr/>
         </p:nvPicPr>
         <p:blipFill>
-          <a:blip r:embed="rId11" cstate="print"/>
+          <a:blip r:embed="rId12" cstate="print"/>
           <a:stretch>
             <a:fillRect/>
           </a:stretch>
@@ -10060,9 +10244,11 @@
         <p:spPr/>
         <p:txBody>
           <a:bodyPr/>
+          <a:lstStyle/>
           <a:p>
             <a:fld id="{B6F15528-21DE-4FAA-801E-634DDDAF4B2B}" type="slidenum">
               <a:rPr/>
+              <a:t>19</a:t>
             </a:fld>
             <a:endParaRPr/>
           </a:p>
@@ -10100,28 +10286,6 @@
           <p:nvPr/>
         </p:nvPicPr>
         <p:blipFill>
-          <a:blip r:embed="rId1" cstate="print"/>
-          <a:stretch>
-            <a:fillRect/>
-          </a:stretch>
-        </p:blipFill>
-        <p:spPr>
-          <a:xfrm>
-            <a:off x="0" y="0"/>
-            <a:ext cx="4636008" cy="6858000"/>
-          </a:xfrm>
-          <a:prstGeom prst="rect">
-            <a:avLst/>
-          </a:prstGeom>
-        </p:spPr>
-      </p:pic>
-      <p:pic>
-        <p:nvPicPr>
-          <p:cNvPr id="3" name="object 3"/>
-          <p:cNvPicPr/>
-          <p:nvPr/>
-        </p:nvPicPr>
-        <p:blipFill>
           <a:blip r:embed="rId2" cstate="print"/>
           <a:stretch>
             <a:fillRect/>
@@ -10129,8 +10293,8 @@
         </p:blipFill>
         <p:spPr>
           <a:xfrm>
-            <a:off x="5240146" y="1952498"/>
-            <a:ext cx="4834382" cy="365760"/>
+            <a:off x="0" y="0"/>
+            <a:ext cx="4636008" cy="6858000"/>
           </a:xfrm>
           <a:prstGeom prst="rect">
             <a:avLst/>
@@ -10139,7 +10303,7 @@
       </p:pic>
       <p:pic>
         <p:nvPicPr>
-          <p:cNvPr id="4" name="object 4"/>
+          <p:cNvPr id="3" name="object 3"/>
           <p:cNvPicPr/>
           <p:nvPr/>
         </p:nvPicPr>
@@ -10151,8 +10315,8 @@
         </p:blipFill>
         <p:spPr>
           <a:xfrm>
-            <a:off x="5240146" y="2546857"/>
-            <a:ext cx="1908048" cy="365760"/>
+            <a:off x="5240146" y="1952498"/>
+            <a:ext cx="4834382" cy="365760"/>
           </a:xfrm>
           <a:prstGeom prst="rect">
             <a:avLst/>
@@ -10161,7 +10325,7 @@
       </p:pic>
       <p:pic>
         <p:nvPicPr>
-          <p:cNvPr id="5" name="object 5"/>
+          <p:cNvPr id="4" name="object 4"/>
           <p:cNvPicPr/>
           <p:nvPr/>
         </p:nvPicPr>
@@ -10173,6 +10337,28 @@
         </p:blipFill>
         <p:spPr>
           <a:xfrm>
+            <a:off x="5240146" y="2546857"/>
+            <a:ext cx="1908048" cy="365760"/>
+          </a:xfrm>
+          <a:prstGeom prst="rect">
+            <a:avLst/>
+          </a:prstGeom>
+        </p:spPr>
+      </p:pic>
+      <p:pic>
+        <p:nvPicPr>
+          <p:cNvPr id="5" name="object 5"/>
+          <p:cNvPicPr/>
+          <p:nvPr/>
+        </p:nvPicPr>
+        <p:blipFill>
+          <a:blip r:embed="rId5" cstate="print"/>
+          <a:stretch>
+            <a:fillRect/>
+          </a:stretch>
+        </p:blipFill>
+        <p:spPr>
+          <a:xfrm>
             <a:off x="5240146" y="3140913"/>
             <a:ext cx="2795143" cy="366064"/>
           </a:xfrm>
@@ -10188,7 +10374,7 @@
           <p:nvPr/>
         </p:nvPicPr>
         <p:blipFill>
-          <a:blip r:embed="rId5" cstate="print"/>
+          <a:blip r:embed="rId6" cstate="print"/>
           <a:stretch>
             <a:fillRect/>
           </a:stretch>
@@ -10224,7 +10410,7 @@
             <p:nvPr/>
           </p:nvPicPr>
           <p:blipFill>
-            <a:blip r:embed="rId6" cstate="print"/>
+            <a:blip r:embed="rId7" cstate="print"/>
             <a:stretch>
               <a:fillRect/>
             </a:stretch>
@@ -10246,7 +10432,7 @@
             <p:nvPr/>
           </p:nvPicPr>
           <p:blipFill>
-            <a:blip r:embed="rId7" cstate="print"/>
+            <a:blip r:embed="rId8" cstate="print"/>
             <a:stretch>
               <a:fillRect/>
             </a:stretch>
@@ -10268,7 +10454,7 @@
             <p:nvPr/>
           </p:nvPicPr>
           <p:blipFill>
-            <a:blip r:embed="rId8" cstate="print"/>
+            <a:blip r:embed="rId9" cstate="print"/>
             <a:stretch>
               <a:fillRect/>
             </a:stretch>
@@ -10291,7 +10477,7 @@
           <p:nvPr/>
         </p:nvPicPr>
         <p:blipFill>
-          <a:blip r:embed="rId9" cstate="print"/>
+          <a:blip r:embed="rId10" cstate="print"/>
           <a:stretch>
             <a:fillRect/>
           </a:stretch>
@@ -10313,7 +10499,7 @@
           <p:nvPr/>
         </p:nvPicPr>
         <p:blipFill>
-          <a:blip r:embed="rId10" cstate="print"/>
+          <a:blip r:embed="rId11" cstate="print"/>
           <a:stretch>
             <a:fillRect/>
           </a:stretch>
@@ -10341,9 +10527,11 @@
         <p:spPr/>
         <p:txBody>
           <a:bodyPr/>
+          <a:lstStyle/>
           <a:p>
             <a:fld id="{B6F15528-21DE-4FAA-801E-634DDDAF4B2B}" type="slidenum">
               <a:rPr/>
+              <a:t>2</a:t>
             </a:fld>
             <a:endParaRPr/>
           </a:p>
@@ -10419,7 +10607,9 @@
         <p:txBody>
           <a:bodyPr wrap="square" lIns="0" tIns="0" rIns="0" bIns="0" rtlCol="0"/>
           <a:lstStyle/>
-          <a:p/>
+          <a:p>
+            <a:endParaRPr/>
+          </a:p>
         </p:txBody>
       </p:sp>
       <p:pic>
@@ -10429,7 +10619,7 @@
           <p:nvPr/>
         </p:nvPicPr>
         <p:blipFill>
-          <a:blip r:embed="rId1" cstate="print"/>
+          <a:blip r:embed="rId2" cstate="print"/>
           <a:stretch>
             <a:fillRect/>
           </a:stretch>
@@ -10503,7 +10693,9 @@
           <p:txBody>
             <a:bodyPr wrap="square" lIns="0" tIns="0" rIns="0" bIns="0" rtlCol="0"/>
             <a:lstStyle/>
-            <a:p/>
+            <a:p>
+              <a:endParaRPr/>
+            </a:p>
           </p:txBody>
         </p:sp>
         <p:sp>
@@ -10563,7 +10755,9 @@
           <p:txBody>
             <a:bodyPr wrap="square" lIns="0" tIns="0" rIns="0" bIns="0" rtlCol="0"/>
             <a:lstStyle/>
-            <a:p/>
+            <a:p>
+              <a:endParaRPr/>
+            </a:p>
           </p:txBody>
         </p:sp>
       </p:grpSp>
@@ -11031,7 +11225,7 @@
             <p:nvPr/>
           </p:nvPicPr>
           <p:blipFill>
-            <a:blip r:embed="rId2" cstate="print"/>
+            <a:blip r:embed="rId3" cstate="print"/>
             <a:stretch>
               <a:fillRect/>
             </a:stretch>
@@ -11053,7 +11247,7 @@
             <p:nvPr/>
           </p:nvPicPr>
           <p:blipFill>
-            <a:blip r:embed="rId3" cstate="print"/>
+            <a:blip r:embed="rId4" cstate="print"/>
             <a:stretch>
               <a:fillRect/>
             </a:stretch>
@@ -11075,7 +11269,7 @@
             <p:nvPr/>
           </p:nvPicPr>
           <p:blipFill>
-            <a:blip r:embed="rId4" cstate="print"/>
+            <a:blip r:embed="rId5" cstate="print"/>
             <a:stretch>
               <a:fillRect/>
             </a:stretch>
@@ -11136,7 +11330,9 @@
         <p:txBody>
           <a:bodyPr wrap="square" lIns="0" tIns="0" rIns="0" bIns="0" rtlCol="0"/>
           <a:lstStyle/>
-          <a:p/>
+          <a:p>
+            <a:endParaRPr/>
+          </a:p>
         </p:txBody>
       </p:sp>
       <p:sp>
@@ -11216,7 +11412,6 @@
               <a:rPr spc="-5" dirty="0"/>
               <a:t>Ann”</a:t>
             </a:r>
-            <a:endParaRPr spc="-5" dirty="0"/>
           </a:p>
         </p:txBody>
       </p:sp>
@@ -11227,7 +11422,7 @@
           <p:nvPr/>
         </p:nvPicPr>
         <p:blipFill>
-          <a:blip r:embed="rId5" cstate="print"/>
+          <a:blip r:embed="rId6" cstate="print"/>
           <a:stretch>
             <a:fillRect/>
           </a:stretch>
@@ -11289,7 +11484,9 @@
         <p:txBody>
           <a:bodyPr wrap="square" lIns="0" tIns="0" rIns="0" bIns="0" rtlCol="0"/>
           <a:lstStyle/>
-          <a:p/>
+          <a:p>
+            <a:endParaRPr/>
+          </a:p>
         </p:txBody>
       </p:sp>
       <p:sp>
@@ -11305,9 +11502,11 @@
         <p:spPr/>
         <p:txBody>
           <a:bodyPr/>
+          <a:lstStyle/>
           <a:p>
             <a:fld id="{B6F15528-21DE-4FAA-801E-634DDDAF4B2B}" type="slidenum">
               <a:rPr/>
+              <a:t>20</a:t>
             </a:fld>
             <a:endParaRPr/>
           </a:p>
@@ -11383,7 +11582,9 @@
         <p:txBody>
           <a:bodyPr wrap="square" lIns="0" tIns="0" rIns="0" bIns="0" rtlCol="0"/>
           <a:lstStyle/>
-          <a:p/>
+          <a:p>
+            <a:endParaRPr/>
+          </a:p>
         </p:txBody>
       </p:sp>
       <p:grpSp>
@@ -11407,7 +11608,7 @@
             <p:nvPr/>
           </p:nvPicPr>
           <p:blipFill>
-            <a:blip r:embed="rId1" cstate="print"/>
+            <a:blip r:embed="rId2" cstate="print"/>
             <a:stretch>
               <a:fillRect/>
             </a:stretch>
@@ -11467,7 +11668,9 @@
           <p:txBody>
             <a:bodyPr wrap="square" lIns="0" tIns="0" rIns="0" bIns="0" rtlCol="0"/>
             <a:lstStyle/>
-            <a:p/>
+            <a:p>
+              <a:endParaRPr/>
+            </a:p>
           </p:txBody>
         </p:sp>
         <p:sp>
@@ -11527,7 +11730,9 @@
           <p:txBody>
             <a:bodyPr wrap="square" lIns="0" tIns="0" rIns="0" bIns="0" rtlCol="0"/>
             <a:lstStyle/>
-            <a:p/>
+            <a:p>
+              <a:endParaRPr/>
+            </a:p>
           </p:txBody>
         </p:sp>
       </p:grpSp>
@@ -12196,7 +12401,7 @@
             <p:nvPr/>
           </p:nvPicPr>
           <p:blipFill>
-            <a:blip r:embed="rId2" cstate="print"/>
+            <a:blip r:embed="rId3" cstate="print"/>
             <a:stretch>
               <a:fillRect/>
             </a:stretch>
@@ -12218,7 +12423,7 @@
             <p:nvPr/>
           </p:nvPicPr>
           <p:blipFill>
-            <a:blip r:embed="rId3" cstate="print"/>
+            <a:blip r:embed="rId4" cstate="print"/>
             <a:stretch>
               <a:fillRect/>
             </a:stretch>
@@ -12240,7 +12445,7 @@
             <p:nvPr/>
           </p:nvPicPr>
           <p:blipFill>
-            <a:blip r:embed="rId4" cstate="print"/>
+            <a:blip r:embed="rId5" cstate="print"/>
             <a:stretch>
               <a:fillRect/>
             </a:stretch>
@@ -12338,7 +12543,6 @@
               <a:rPr spc="-5" dirty="0"/>
               <a:t>Ann”</a:t>
             </a:r>
-            <a:endParaRPr spc="-5" dirty="0"/>
           </a:p>
         </p:txBody>
       </p:sp>
@@ -12349,7 +12553,7 @@
           <p:nvPr/>
         </p:nvPicPr>
         <p:blipFill>
-          <a:blip r:embed="rId5" cstate="print"/>
+          <a:blip r:embed="rId6" cstate="print"/>
           <a:stretch>
             <a:fillRect/>
           </a:stretch>
@@ -12425,7 +12629,9 @@
           <p:txBody>
             <a:bodyPr wrap="square" lIns="0" tIns="0" rIns="0" bIns="0" rtlCol="0"/>
             <a:lstStyle/>
-            <a:p/>
+            <a:p>
+              <a:endParaRPr/>
+            </a:p>
           </p:txBody>
         </p:sp>
         <p:sp>
@@ -12677,7 +12883,9 @@
           <p:txBody>
             <a:bodyPr wrap="square" lIns="0" tIns="0" rIns="0" bIns="0" rtlCol="0"/>
             <a:lstStyle/>
-            <a:p/>
+            <a:p>
+              <a:endParaRPr/>
+            </a:p>
           </p:txBody>
         </p:sp>
         <p:sp>
@@ -12727,7 +12935,9 @@
           <p:txBody>
             <a:bodyPr wrap="square" lIns="0" tIns="0" rIns="0" bIns="0" rtlCol="0"/>
             <a:lstStyle/>
-            <a:p/>
+            <a:p>
+              <a:endParaRPr/>
+            </a:p>
           </p:txBody>
         </p:sp>
         <p:sp>
@@ -12979,7 +13189,9 @@
           <p:txBody>
             <a:bodyPr wrap="square" lIns="0" tIns="0" rIns="0" bIns="0" rtlCol="0"/>
             <a:lstStyle/>
-            <a:p/>
+            <a:p>
+              <a:endParaRPr/>
+            </a:p>
           </p:txBody>
         </p:sp>
       </p:grpSp>
@@ -12996,9 +13208,11 @@
         <p:spPr/>
         <p:txBody>
           <a:bodyPr/>
+          <a:lstStyle/>
           <a:p>
             <a:fld id="{B6F15528-21DE-4FAA-801E-634DDDAF4B2B}" type="slidenum">
               <a:rPr/>
+              <a:t>21</a:t>
             </a:fld>
             <a:endParaRPr/>
           </a:p>
@@ -13050,7 +13264,7 @@
             <p:nvPr/>
           </p:nvPicPr>
           <p:blipFill>
-            <a:blip r:embed="rId1" cstate="print"/>
+            <a:blip r:embed="rId2" cstate="print"/>
             <a:stretch>
               <a:fillRect/>
             </a:stretch>
@@ -13072,7 +13286,7 @@
             <p:nvPr/>
           </p:nvPicPr>
           <p:blipFill>
-            <a:blip r:embed="rId2" cstate="print"/>
+            <a:blip r:embed="rId3" cstate="print"/>
             <a:stretch>
               <a:fillRect/>
             </a:stretch>
@@ -13095,7 +13309,7 @@
           <p:nvPr/>
         </p:nvPicPr>
         <p:blipFill>
-          <a:blip r:embed="rId3" cstate="print"/>
+          <a:blip r:embed="rId4" cstate="print"/>
           <a:stretch>
             <a:fillRect/>
           </a:stretch>
@@ -13187,7 +13401,7 @@
           <p:nvPr/>
         </p:nvPicPr>
         <p:blipFill>
-          <a:blip r:embed="rId4" cstate="print"/>
+          <a:blip r:embed="rId5" cstate="print"/>
           <a:stretch>
             <a:fillRect/>
           </a:stretch>
@@ -13209,7 +13423,7 @@
           <p:nvPr/>
         </p:nvPicPr>
         <p:blipFill>
-          <a:blip r:embed="rId5" cstate="print"/>
+          <a:blip r:embed="rId6" cstate="print"/>
           <a:stretch>
             <a:fillRect/>
           </a:stretch>
@@ -13231,7 +13445,7 @@
           <p:nvPr/>
         </p:nvPicPr>
         <p:blipFill>
-          <a:blip r:embed="rId6" cstate="print"/>
+          <a:blip r:embed="rId7" cstate="print"/>
           <a:stretch>
             <a:fillRect/>
           </a:stretch>
@@ -13299,7 +13513,7 @@
           <p:nvPr/>
         </p:nvPicPr>
         <p:blipFill>
-          <a:blip r:embed="rId7" cstate="print"/>
+          <a:blip r:embed="rId8" cstate="print"/>
           <a:stretch>
             <a:fillRect/>
           </a:stretch>
@@ -13327,9 +13541,11 @@
         <p:spPr/>
         <p:txBody>
           <a:bodyPr/>
+          <a:lstStyle/>
           <a:p>
             <a:fld id="{B6F15528-21DE-4FAA-801E-634DDDAF4B2B}" type="slidenum">
               <a:rPr/>
+              <a:t>22</a:t>
             </a:fld>
             <a:endParaRPr/>
           </a:p>
@@ -13367,7 +13583,7 @@
           <p:nvPr/>
         </p:nvPicPr>
         <p:blipFill>
-          <a:blip r:embed="rId1" cstate="print"/>
+          <a:blip r:embed="rId2" cstate="print"/>
           <a:stretch>
             <a:fillRect/>
           </a:stretch>
@@ -13389,7 +13605,7 @@
           <p:nvPr/>
         </p:nvPicPr>
         <p:blipFill>
-          <a:blip r:embed="rId2" cstate="print"/>
+          <a:blip r:embed="rId3" cstate="print"/>
           <a:stretch>
             <a:fillRect/>
           </a:stretch>
@@ -13481,7 +13697,7 @@
           <p:nvPr/>
         </p:nvPicPr>
         <p:blipFill>
-          <a:blip r:embed="rId3" cstate="print"/>
+          <a:blip r:embed="rId4" cstate="print"/>
           <a:stretch>
             <a:fillRect/>
           </a:stretch>
@@ -13503,7 +13719,7 @@
           <p:nvPr/>
         </p:nvPicPr>
         <p:blipFill>
-          <a:blip r:embed="rId4" cstate="print"/>
+          <a:blip r:embed="rId5" cstate="print"/>
           <a:stretch>
             <a:fillRect/>
           </a:stretch>
@@ -13525,7 +13741,7 @@
           <p:nvPr/>
         </p:nvPicPr>
         <p:blipFill>
-          <a:blip r:embed="rId5" cstate="print"/>
+          <a:blip r:embed="rId6" cstate="print"/>
           <a:stretch>
             <a:fillRect/>
           </a:stretch>
@@ -13617,7 +13833,7 @@
           <p:nvPr/>
         </p:nvPicPr>
         <p:blipFill>
-          <a:blip r:embed="rId6" cstate="print"/>
+          <a:blip r:embed="rId7" cstate="print"/>
           <a:stretch>
             <a:fillRect/>
           </a:stretch>
@@ -13653,7 +13869,7 @@
             <p:nvPr/>
           </p:nvPicPr>
           <p:blipFill>
-            <a:blip r:embed="rId7" cstate="print"/>
+            <a:blip r:embed="rId8" cstate="print"/>
             <a:stretch>
               <a:fillRect/>
             </a:stretch>
@@ -13675,7 +13891,7 @@
             <p:nvPr/>
           </p:nvPicPr>
           <p:blipFill>
-            <a:blip r:embed="rId8" cstate="print"/>
+            <a:blip r:embed="rId9" cstate="print"/>
             <a:stretch>
               <a:fillRect/>
             </a:stretch>
@@ -13698,7 +13914,7 @@
           <p:nvPr/>
         </p:nvPicPr>
         <p:blipFill>
-          <a:blip r:embed="rId9" cstate="print"/>
+          <a:blip r:embed="rId10" cstate="print"/>
           <a:stretch>
             <a:fillRect/>
           </a:stretch>
@@ -13726,9 +13942,11 @@
         <p:spPr/>
         <p:txBody>
           <a:bodyPr/>
+          <a:lstStyle/>
           <a:p>
             <a:fld id="{B6F15528-21DE-4FAA-801E-634DDDAF4B2B}" type="slidenum">
               <a:rPr/>
+              <a:t>23</a:t>
             </a:fld>
             <a:endParaRPr/>
           </a:p>
@@ -13766,7 +13984,7 @@
           <p:nvPr/>
         </p:nvPicPr>
         <p:blipFill>
-          <a:blip r:embed="rId1" cstate="print"/>
+          <a:blip r:embed="rId2" cstate="print"/>
           <a:stretch>
             <a:fillRect/>
           </a:stretch>
@@ -13788,7 +14006,7 @@
           <p:nvPr/>
         </p:nvPicPr>
         <p:blipFill>
-          <a:blip r:embed="rId2" cstate="print"/>
+          <a:blip r:embed="rId3" cstate="print"/>
           <a:stretch>
             <a:fillRect/>
           </a:stretch>
@@ -13904,7 +14122,7 @@
           <p:nvPr/>
         </p:nvPicPr>
         <p:blipFill>
-          <a:blip r:embed="rId3" cstate="print"/>
+          <a:blip r:embed="rId4" cstate="print"/>
           <a:stretch>
             <a:fillRect/>
           </a:stretch>
@@ -13926,7 +14144,7 @@
           <p:nvPr/>
         </p:nvPicPr>
         <p:blipFill>
-          <a:blip r:embed="rId4" cstate="print"/>
+          <a:blip r:embed="rId5" cstate="print"/>
           <a:stretch>
             <a:fillRect/>
           </a:stretch>
@@ -13948,7 +14166,7 @@
           <p:nvPr/>
         </p:nvPicPr>
         <p:blipFill>
-          <a:blip r:embed="rId5" cstate="print"/>
+          <a:blip r:embed="rId6" cstate="print"/>
           <a:stretch>
             <a:fillRect/>
           </a:stretch>
@@ -13984,7 +14202,7 @@
             <p:nvPr/>
           </p:nvPicPr>
           <p:blipFill>
-            <a:blip r:embed="rId6" cstate="print"/>
+            <a:blip r:embed="rId7" cstate="print"/>
             <a:stretch>
               <a:fillRect/>
             </a:stretch>
@@ -14006,7 +14224,7 @@
             <p:nvPr/>
           </p:nvPicPr>
           <p:blipFill>
-            <a:blip r:embed="rId7" cstate="print"/>
+            <a:blip r:embed="rId8" cstate="print"/>
             <a:stretch>
               <a:fillRect/>
             </a:stretch>
@@ -14028,7 +14246,7 @@
             <p:nvPr/>
           </p:nvPicPr>
           <p:blipFill>
-            <a:blip r:embed="rId8" cstate="print"/>
+            <a:blip r:embed="rId9" cstate="print"/>
             <a:stretch>
               <a:fillRect/>
             </a:stretch>
@@ -14135,7 +14353,7 @@
             <p:nvPr/>
           </p:nvPicPr>
           <p:blipFill>
-            <a:blip r:embed="rId9" cstate="print"/>
+            <a:blip r:embed="rId10" cstate="print"/>
             <a:stretch>
               <a:fillRect/>
             </a:stretch>
@@ -14157,7 +14375,7 @@
             <p:nvPr/>
           </p:nvPicPr>
           <p:blipFill>
-            <a:blip r:embed="rId10" cstate="print"/>
+            <a:blip r:embed="rId11" cstate="print"/>
             <a:stretch>
               <a:fillRect/>
             </a:stretch>
@@ -14180,7 +14398,7 @@
           <p:nvPr/>
         </p:nvPicPr>
         <p:blipFill>
-          <a:blip r:embed="rId11" cstate="print"/>
+          <a:blip r:embed="rId12" cstate="print"/>
           <a:stretch>
             <a:fillRect/>
           </a:stretch>
@@ -14202,7 +14420,7 @@
           <p:nvPr/>
         </p:nvPicPr>
         <p:blipFill>
-          <a:blip r:embed="rId12" cstate="print"/>
+          <a:blip r:embed="rId13" cstate="print"/>
           <a:stretch>
             <a:fillRect/>
           </a:stretch>
@@ -14230,9 +14448,11 @@
         <p:spPr/>
         <p:txBody>
           <a:bodyPr/>
+          <a:lstStyle/>
           <a:p>
             <a:fld id="{B6F15528-21DE-4FAA-801E-634DDDAF4B2B}" type="slidenum">
               <a:rPr/>
+              <a:t>24</a:t>
             </a:fld>
             <a:endParaRPr/>
           </a:p>
@@ -14300,7 +14520,9 @@
         <p:txBody>
           <a:bodyPr wrap="square" lIns="0" tIns="0" rIns="0" bIns="0" rtlCol="0"/>
           <a:lstStyle/>
-          <a:p/>
+          <a:p>
+            <a:endParaRPr/>
+          </a:p>
         </p:txBody>
       </p:sp>
       <p:pic>
@@ -14310,7 +14532,7 @@
           <p:nvPr/>
         </p:nvPicPr>
         <p:blipFill>
-          <a:blip r:embed="rId1" cstate="print"/>
+          <a:blip r:embed="rId2" cstate="print"/>
           <a:stretch>
             <a:fillRect/>
           </a:stretch>
@@ -14332,7 +14554,7 @@
           <p:nvPr/>
         </p:nvPicPr>
         <p:blipFill>
-          <a:blip r:embed="rId2" cstate="print"/>
+          <a:blip r:embed="rId3" cstate="print"/>
           <a:stretch>
             <a:fillRect/>
           </a:stretch>
@@ -14472,28 +14694,6 @@
           <p:nvPr/>
         </p:nvPicPr>
         <p:blipFill>
-          <a:blip r:embed="rId3" cstate="print"/>
-          <a:stretch>
-            <a:fillRect/>
-          </a:stretch>
-        </p:blipFill>
-        <p:spPr>
-          <a:xfrm>
-            <a:off x="5624829" y="2797505"/>
-            <a:ext cx="4908423" cy="366064"/>
-          </a:xfrm>
-          <a:prstGeom prst="rect">
-            <a:avLst/>
-          </a:prstGeom>
-        </p:spPr>
-      </p:pic>
-      <p:pic>
-        <p:nvPicPr>
-          <p:cNvPr id="7" name="object 7"/>
-          <p:cNvPicPr/>
-          <p:nvPr/>
-        </p:nvPicPr>
-        <p:blipFill>
           <a:blip r:embed="rId4" cstate="print"/>
           <a:stretch>
             <a:fillRect/>
@@ -14501,8 +14701,8 @@
         </p:blipFill>
         <p:spPr>
           <a:xfrm>
-            <a:off x="5624829" y="3240023"/>
-            <a:ext cx="6344285" cy="365760"/>
+            <a:off x="5624829" y="2797505"/>
+            <a:ext cx="4908423" cy="366064"/>
           </a:xfrm>
           <a:prstGeom prst="rect">
             <a:avLst/>
@@ -14511,7 +14711,7 @@
       </p:pic>
       <p:pic>
         <p:nvPicPr>
-          <p:cNvPr id="8" name="object 8"/>
+          <p:cNvPr id="7" name="object 7"/>
           <p:cNvPicPr/>
           <p:nvPr/>
         </p:nvPicPr>
@@ -14523,8 +14723,8 @@
         </p:blipFill>
         <p:spPr>
           <a:xfrm>
-            <a:off x="5624829" y="3681984"/>
-            <a:ext cx="2689860" cy="365760"/>
+            <a:off x="5624829" y="3240023"/>
+            <a:ext cx="6344285" cy="365760"/>
           </a:xfrm>
           <a:prstGeom prst="rect">
             <a:avLst/>
@@ -14533,7 +14733,7 @@
       </p:pic>
       <p:pic>
         <p:nvPicPr>
-          <p:cNvPr id="9" name="object 9"/>
+          <p:cNvPr id="8" name="object 8"/>
           <p:cNvPicPr/>
           <p:nvPr/>
         </p:nvPicPr>
@@ -14545,6 +14745,28 @@
         </p:blipFill>
         <p:spPr>
           <a:xfrm>
+            <a:off x="5624829" y="3681984"/>
+            <a:ext cx="2689860" cy="365760"/>
+          </a:xfrm>
+          <a:prstGeom prst="rect">
+            <a:avLst/>
+          </a:prstGeom>
+        </p:spPr>
+      </p:pic>
+      <p:pic>
+        <p:nvPicPr>
+          <p:cNvPr id="9" name="object 9"/>
+          <p:cNvPicPr/>
+          <p:nvPr/>
+        </p:nvPicPr>
+        <p:blipFill>
+          <a:blip r:embed="rId7" cstate="print"/>
+          <a:stretch>
+            <a:fillRect/>
+          </a:stretch>
+        </p:blipFill>
+        <p:spPr>
+          <a:xfrm>
             <a:off x="5624829" y="4123639"/>
             <a:ext cx="2529712" cy="366064"/>
           </a:xfrm>
@@ -14560,7 +14782,7 @@
           <p:nvPr/>
         </p:nvPicPr>
         <p:blipFill>
-          <a:blip r:embed="rId7" cstate="print"/>
+          <a:blip r:embed="rId8" cstate="print"/>
           <a:stretch>
             <a:fillRect/>
           </a:stretch>
@@ -14588,9 +14810,11 @@
         <p:spPr/>
         <p:txBody>
           <a:bodyPr/>
+          <a:lstStyle/>
           <a:p>
             <a:fld id="{B6F15528-21DE-4FAA-801E-634DDDAF4B2B}" type="slidenum">
               <a:rPr/>
+              <a:t>3</a:t>
             </a:fld>
             <a:endParaRPr/>
           </a:p>
@@ -14658,7 +14882,9 @@
         <p:txBody>
           <a:bodyPr wrap="square" lIns="0" tIns="0" rIns="0" bIns="0" rtlCol="0"/>
           <a:lstStyle/>
-          <a:p/>
+          <a:p>
+            <a:endParaRPr/>
+          </a:p>
         </p:txBody>
       </p:sp>
       <p:pic>
@@ -14668,7 +14894,7 @@
           <p:nvPr/>
         </p:nvPicPr>
         <p:blipFill>
-          <a:blip r:embed="rId1" cstate="print"/>
+          <a:blip r:embed="rId2" cstate="print"/>
           <a:stretch>
             <a:fillRect/>
           </a:stretch>
@@ -14690,7 +14916,7 @@
           <p:nvPr/>
         </p:nvPicPr>
         <p:blipFill>
-          <a:blip r:embed="rId2" cstate="print"/>
+          <a:blip r:embed="rId3" cstate="print"/>
           <a:stretch>
             <a:fillRect/>
           </a:stretch>
@@ -14758,7 +14984,7 @@
           <p:nvPr/>
         </p:nvPicPr>
         <p:blipFill>
-          <a:blip r:embed="rId3" cstate="print"/>
+          <a:blip r:embed="rId4" cstate="print"/>
           <a:stretch>
             <a:fillRect/>
           </a:stretch>
@@ -14780,7 +15006,7 @@
           <p:nvPr/>
         </p:nvPicPr>
         <p:blipFill>
-          <a:blip r:embed="rId4" cstate="print"/>
+          <a:blip r:embed="rId5" cstate="print"/>
           <a:stretch>
             <a:fillRect/>
           </a:stretch>
@@ -14872,7 +15098,7 @@
           <p:nvPr/>
         </p:nvPicPr>
         <p:blipFill>
-          <a:blip r:embed="rId5" cstate="print"/>
+          <a:blip r:embed="rId6" cstate="print"/>
           <a:stretch>
             <a:fillRect/>
           </a:stretch>
@@ -14894,7 +15120,7 @@
           <p:nvPr/>
         </p:nvPicPr>
         <p:blipFill>
-          <a:blip r:embed="rId6" cstate="print"/>
+          <a:blip r:embed="rId7" cstate="print"/>
           <a:stretch>
             <a:fillRect/>
           </a:stretch>
@@ -14916,7 +15142,7 @@
           <p:nvPr/>
         </p:nvPicPr>
         <p:blipFill>
-          <a:blip r:embed="rId7" cstate="print"/>
+          <a:blip r:embed="rId8" cstate="print"/>
           <a:stretch>
             <a:fillRect/>
           </a:stretch>
@@ -15060,47 +15286,7 @@
                 <a:latin typeface="Courier New" panose="02070309020205020404"/>
                 <a:cs typeface="Courier New" panose="02070309020205020404"/>
               </a:rPr>
-              <a:t>typed</a:t>
-            </a:r>
-            <a:r>
-              <a:rPr sz="2000" spc="-5" dirty="0">
-                <a:solidFill>
-                  <a:srgbClr val="2A9FBB"/>
-                </a:solidFill>
-                <a:latin typeface="Courier New" panose="02070309020205020404"/>
-                <a:cs typeface="Courier New" panose="02070309020205020404"/>
-              </a:rPr>
-              <a:t>-</a:t>
-            </a:r>
-            <a:r>
-              <a:rPr sz="2000" spc="-5" dirty="0">
-                <a:solidFill>
-                  <a:srgbClr val="2A9FBB"/>
-                </a:solidFill>
-                <a:latin typeface="Courier New" panose="02070309020205020404"/>
-                <a:cs typeface="Courier New" panose="02070309020205020404"/>
-              </a:rPr>
-              <a:t>parameter</a:t>
-            </a:r>
-            <a:r>
-              <a:rPr sz="2000" spc="-5" dirty="0">
-                <a:solidFill>
-                  <a:srgbClr val="2A9FBB"/>
-                </a:solidFill>
-                <a:latin typeface="Courier New" panose="02070309020205020404"/>
-                <a:cs typeface="Courier New" panose="02070309020205020404"/>
-              </a:rPr>
-              <a:t>-</a:t>
-            </a:r>
-            <a:r>
-              <a:rPr sz="2000" spc="-5" dirty="0">
-                <a:solidFill>
-                  <a:srgbClr val="2A9FBB"/>
-                </a:solidFill>
-                <a:latin typeface="Courier New" panose="02070309020205020404"/>
-                <a:cs typeface="Courier New" panose="02070309020205020404"/>
-              </a:rPr>
-              <a:t>list</a:t>
+              <a:t>typed-parameter-list</a:t>
             </a:r>
             <a:endParaRPr sz="2000">
               <a:latin typeface="Courier New" panose="02070309020205020404"/>
@@ -15200,7 +15386,9 @@
         <p:txBody>
           <a:bodyPr wrap="square" lIns="0" tIns="0" rIns="0" bIns="0" rtlCol="0"/>
           <a:lstStyle/>
-          <a:p/>
+          <a:p>
+            <a:endParaRPr/>
+          </a:p>
         </p:txBody>
       </p:sp>
       <p:sp>
@@ -15216,9 +15404,11 @@
         <p:spPr/>
         <p:txBody>
           <a:bodyPr/>
+          <a:lstStyle/>
           <a:p>
             <a:fld id="{B6F15528-21DE-4FAA-801E-634DDDAF4B2B}" type="slidenum">
               <a:rPr/>
+              <a:t>4</a:t>
             </a:fld>
             <a:endParaRPr/>
           </a:p>
@@ -15286,7 +15476,9 @@
         <p:txBody>
           <a:bodyPr wrap="square" lIns="0" tIns="0" rIns="0" bIns="0" rtlCol="0"/>
           <a:lstStyle/>
-          <a:p/>
+          <a:p>
+            <a:endParaRPr/>
+          </a:p>
         </p:txBody>
       </p:sp>
       <p:pic>
@@ -15296,7 +15488,7 @@
           <p:nvPr/>
         </p:nvPicPr>
         <p:blipFill>
-          <a:blip r:embed="rId1" cstate="print"/>
+          <a:blip r:embed="rId2" cstate="print"/>
           <a:stretch>
             <a:fillRect/>
           </a:stretch>
@@ -15318,7 +15510,7 @@
           <p:nvPr/>
         </p:nvPicPr>
         <p:blipFill>
-          <a:blip r:embed="rId2" cstate="print"/>
+          <a:blip r:embed="rId3" cstate="print"/>
           <a:stretch>
             <a:fillRect/>
           </a:stretch>
@@ -15410,7 +15602,7 @@
           <p:nvPr/>
         </p:nvPicPr>
         <p:blipFill>
-          <a:blip r:embed="rId3" cstate="print"/>
+          <a:blip r:embed="rId4" cstate="print"/>
           <a:stretch>
             <a:fillRect/>
           </a:stretch>
@@ -15432,7 +15624,7 @@
           <p:nvPr/>
         </p:nvPicPr>
         <p:blipFill>
-          <a:blip r:embed="rId4" cstate="print"/>
+          <a:blip r:embed="rId5" cstate="print"/>
           <a:stretch>
             <a:fillRect/>
           </a:stretch>
@@ -15454,7 +15646,7 @@
           <p:nvPr/>
         </p:nvPicPr>
         <p:blipFill>
-          <a:blip r:embed="rId5" cstate="print"/>
+          <a:blip r:embed="rId6" cstate="print"/>
           <a:stretch>
             <a:fillRect/>
           </a:stretch>
@@ -15546,7 +15738,7 @@
           <p:nvPr/>
         </p:nvPicPr>
         <p:blipFill>
-          <a:blip r:embed="rId6" cstate="print"/>
+          <a:blip r:embed="rId7" cstate="print"/>
           <a:stretch>
             <a:fillRect/>
           </a:stretch>
@@ -15568,7 +15760,7 @@
           <p:nvPr/>
         </p:nvPicPr>
         <p:blipFill>
-          <a:blip r:embed="rId7" cstate="print"/>
+          <a:blip r:embed="rId8" cstate="print"/>
           <a:stretch>
             <a:fillRect/>
           </a:stretch>
@@ -15590,7 +15782,7 @@
           <p:nvPr/>
         </p:nvPicPr>
         <p:blipFill>
-          <a:blip r:embed="rId8" cstate="print"/>
+          <a:blip r:embed="rId9" cstate="print"/>
           <a:stretch>
             <a:fillRect/>
           </a:stretch>
@@ -15642,27 +15834,7 @@
                 <a:latin typeface="Courier New" panose="02070309020205020404"/>
                 <a:cs typeface="Courier New" panose="02070309020205020404"/>
               </a:rPr>
-              <a:t>return</a:t>
-            </a:r>
-            <a:r>
-              <a:rPr sz="2000" spc="-5" dirty="0">
-                <a:solidFill>
-                  <a:srgbClr val="9BC750"/>
-                </a:solidFill>
-                <a:latin typeface="Courier New" panose="02070309020205020404"/>
-                <a:cs typeface="Courier New" panose="02070309020205020404"/>
-              </a:rPr>
-              <a:t>-</a:t>
-            </a:r>
-            <a:r>
-              <a:rPr sz="2000" spc="-5" dirty="0">
-                <a:solidFill>
-                  <a:srgbClr val="9BC750"/>
-                </a:solidFill>
-                <a:latin typeface="Courier New" panose="02070309020205020404"/>
-                <a:cs typeface="Courier New" panose="02070309020205020404"/>
-              </a:rPr>
-              <a:t>type</a:t>
+              <a:t>return-type</a:t>
             </a:r>
             <a:endParaRPr sz="2000">
               <a:latin typeface="Courier New" panose="02070309020205020404"/>
@@ -15762,7 +15934,9 @@
         <p:txBody>
           <a:bodyPr wrap="square" lIns="0" tIns="0" rIns="0" bIns="0" rtlCol="0"/>
           <a:lstStyle/>
-          <a:p/>
+          <a:p>
+            <a:endParaRPr/>
+          </a:p>
         </p:txBody>
       </p:sp>
       <p:sp>
@@ -15912,9 +16086,11 @@
         <p:spPr/>
         <p:txBody>
           <a:bodyPr/>
+          <a:lstStyle/>
           <a:p>
             <a:fld id="{B6F15528-21DE-4FAA-801E-634DDDAF4B2B}" type="slidenum">
               <a:rPr/>
+              <a:t>5</a:t>
             </a:fld>
             <a:endParaRPr/>
           </a:p>
@@ -15990,7 +16166,9 @@
         <p:txBody>
           <a:bodyPr wrap="square" lIns="0" tIns="0" rIns="0" bIns="0" rtlCol="0"/>
           <a:lstStyle/>
-          <a:p/>
+          <a:p>
+            <a:endParaRPr/>
+          </a:p>
         </p:txBody>
       </p:sp>
       <p:grpSp>
@@ -16014,7 +16192,7 @@
             <p:nvPr/>
           </p:nvPicPr>
           <p:blipFill>
-            <a:blip r:embed="rId1" cstate="print"/>
+            <a:blip r:embed="rId2" cstate="print"/>
             <a:stretch>
               <a:fillRect/>
             </a:stretch>
@@ -16074,7 +16252,9 @@
           <p:txBody>
             <a:bodyPr wrap="square" lIns="0" tIns="0" rIns="0" bIns="0" rtlCol="0"/>
             <a:lstStyle/>
-            <a:p/>
+            <a:p>
+              <a:endParaRPr/>
+            </a:p>
           </p:txBody>
         </p:sp>
         <p:sp>
@@ -16134,7 +16314,9 @@
           <p:txBody>
             <a:bodyPr wrap="square" lIns="0" tIns="0" rIns="0" bIns="0" rtlCol="0"/>
             <a:lstStyle/>
-            <a:p/>
+            <a:p>
+              <a:endParaRPr/>
+            </a:p>
           </p:txBody>
         </p:sp>
       </p:grpSp>
@@ -16908,7 +17090,7 @@
           <p:nvPr/>
         </p:nvPicPr>
         <p:blipFill>
-          <a:blip r:embed="rId2" cstate="print"/>
+          <a:blip r:embed="rId3" cstate="print"/>
           <a:stretch>
             <a:fillRect/>
           </a:stretch>
@@ -16944,7 +17126,7 @@
             <p:nvPr/>
           </p:nvPicPr>
           <p:blipFill>
-            <a:blip r:embed="rId3" cstate="print"/>
+            <a:blip r:embed="rId4" cstate="print"/>
             <a:stretch>
               <a:fillRect/>
             </a:stretch>
@@ -17024,7 +17206,9 @@
           <p:txBody>
             <a:bodyPr wrap="square" lIns="0" tIns="0" rIns="0" bIns="0" rtlCol="0"/>
             <a:lstStyle/>
-            <a:p/>
+            <a:p>
+              <a:endParaRPr/>
+            </a:p>
           </p:txBody>
         </p:sp>
         <p:sp>
@@ -17075,7 +17259,9 @@
           <p:txBody>
             <a:bodyPr wrap="square" lIns="0" tIns="0" rIns="0" bIns="0" rtlCol="0"/>
             <a:lstStyle/>
-            <a:p/>
+            <a:p>
+              <a:endParaRPr/>
+            </a:p>
           </p:txBody>
         </p:sp>
         <p:sp>
@@ -17143,7 +17329,9 @@
           <p:txBody>
             <a:bodyPr wrap="square" lIns="0" tIns="0" rIns="0" bIns="0" rtlCol="0"/>
             <a:lstStyle/>
-            <a:p/>
+            <a:p>
+              <a:endParaRPr/>
+            </a:p>
           </p:txBody>
         </p:sp>
       </p:grpSp>
@@ -17160,9 +17348,11 @@
         <p:spPr/>
         <p:txBody>
           <a:bodyPr/>
+          <a:lstStyle/>
           <a:p>
             <a:fld id="{B6F15528-21DE-4FAA-801E-634DDDAF4B2B}" type="slidenum">
               <a:rPr/>
+              <a:t>6</a:t>
             </a:fld>
             <a:endParaRPr/>
           </a:p>
@@ -17200,28 +17390,6 @@
           <p:nvPr/>
         </p:nvPicPr>
         <p:blipFill>
-          <a:blip r:embed="rId1" cstate="print"/>
-          <a:stretch>
-            <a:fillRect/>
-          </a:stretch>
-        </p:blipFill>
-        <p:spPr>
-          <a:xfrm>
-            <a:off x="1926487" y="1883836"/>
-            <a:ext cx="2640762" cy="2311534"/>
-          </a:xfrm>
-          <a:prstGeom prst="rect">
-            <a:avLst/>
-          </a:prstGeom>
-        </p:spPr>
-      </p:pic>
-      <p:pic>
-        <p:nvPicPr>
-          <p:cNvPr id="3" name="object 3"/>
-          <p:cNvPicPr/>
-          <p:nvPr/>
-        </p:nvPicPr>
-        <p:blipFill>
           <a:blip r:embed="rId2" cstate="print"/>
           <a:stretch>
             <a:fillRect/>
@@ -17229,8 +17397,8 @@
         </p:blipFill>
         <p:spPr>
           <a:xfrm>
-            <a:off x="2666364" y="4569586"/>
-            <a:ext cx="1305560" cy="304800"/>
+            <a:off x="1926487" y="1883836"/>
+            <a:ext cx="2640762" cy="2311534"/>
           </a:xfrm>
           <a:prstGeom prst="rect">
             <a:avLst/>
@@ -17239,7 +17407,7 @@
       </p:pic>
       <p:pic>
         <p:nvPicPr>
-          <p:cNvPr id="4" name="object 4"/>
+          <p:cNvPr id="3" name="object 3"/>
           <p:cNvPicPr/>
           <p:nvPr/>
         </p:nvPicPr>
@@ -17251,8 +17419,8 @@
         </p:blipFill>
         <p:spPr>
           <a:xfrm>
-            <a:off x="907389" y="4950586"/>
-            <a:ext cx="4814951" cy="274319"/>
+            <a:off x="2666364" y="4569586"/>
+            <a:ext cx="1305560" cy="304800"/>
           </a:xfrm>
           <a:prstGeom prst="rect">
             <a:avLst/>
@@ -17261,7 +17429,7 @@
       </p:pic>
       <p:pic>
         <p:nvPicPr>
-          <p:cNvPr id="5" name="object 5"/>
+          <p:cNvPr id="4" name="object 4"/>
           <p:cNvPicPr/>
           <p:nvPr/>
         </p:nvPicPr>
@@ -17273,6 +17441,28 @@
         </p:blipFill>
         <p:spPr>
           <a:xfrm>
+            <a:off x="907389" y="4950586"/>
+            <a:ext cx="4814951" cy="274319"/>
+          </a:xfrm>
+          <a:prstGeom prst="rect">
+            <a:avLst/>
+          </a:prstGeom>
+        </p:spPr>
+      </p:pic>
+      <p:pic>
+        <p:nvPicPr>
+          <p:cNvPr id="5" name="object 5"/>
+          <p:cNvPicPr/>
+          <p:nvPr/>
+        </p:nvPicPr>
+        <p:blipFill>
+          <a:blip r:embed="rId5" cstate="print"/>
+          <a:stretch>
+            <a:fillRect/>
+          </a:stretch>
+        </p:blipFill>
+        <p:spPr>
+          <a:xfrm>
             <a:off x="8218043" y="4569586"/>
             <a:ext cx="1594230" cy="304800"/>
           </a:xfrm>
@@ -17288,7 +17478,7 @@
           <p:nvPr/>
         </p:nvPicPr>
         <p:blipFill>
-          <a:blip r:embed="rId5" cstate="print"/>
+          <a:blip r:embed="rId6" cstate="print"/>
           <a:stretch>
             <a:fillRect/>
           </a:stretch>
@@ -17324,7 +17514,7 @@
             <p:nvPr/>
           </p:nvPicPr>
           <p:blipFill>
-            <a:blip r:embed="rId6" cstate="print"/>
+            <a:blip r:embed="rId7" cstate="print"/>
             <a:stretch>
               <a:fillRect/>
             </a:stretch>
@@ -17346,7 +17536,7 @@
             <p:nvPr/>
           </p:nvPicPr>
           <p:blipFill>
-            <a:blip r:embed="rId7" cstate="print"/>
+            <a:blip r:embed="rId8" cstate="print"/>
             <a:stretch>
               <a:fillRect/>
             </a:stretch>
@@ -17369,7 +17559,7 @@
           <p:nvPr/>
         </p:nvPicPr>
         <p:blipFill>
-          <a:blip r:embed="rId8" cstate="print"/>
+          <a:blip r:embed="rId9" cstate="print"/>
           <a:stretch>
             <a:fillRect/>
           </a:stretch>
@@ -17391,7 +17581,7 @@
           <p:nvPr/>
         </p:nvPicPr>
         <p:blipFill>
-          <a:blip r:embed="rId9" cstate="print"/>
+          <a:blip r:embed="rId10" cstate="print"/>
           <a:stretch>
             <a:fillRect/>
           </a:stretch>
@@ -17419,9 +17609,11 @@
         <p:spPr/>
         <p:txBody>
           <a:bodyPr/>
+          <a:lstStyle/>
           <a:p>
             <a:fld id="{B6F15528-21DE-4FAA-801E-634DDDAF4B2B}" type="slidenum">
               <a:rPr/>
+              <a:t>7</a:t>
             </a:fld>
             <a:endParaRPr/>
           </a:p>
@@ -18212,7 +18404,7 @@
           <p:nvPr/>
         </p:nvPicPr>
         <p:blipFill>
-          <a:blip r:embed="rId1" cstate="print"/>
+          <a:blip r:embed="rId2" cstate="print"/>
           <a:stretch>
             <a:fillRect/>
           </a:stretch>
@@ -18288,7 +18480,9 @@
           <p:txBody>
             <a:bodyPr wrap="square" lIns="0" tIns="0" rIns="0" bIns="0" rtlCol="0"/>
             <a:lstStyle/>
-            <a:p/>
+            <a:p>
+              <a:endParaRPr/>
+            </a:p>
           </p:txBody>
         </p:sp>
         <p:sp>
@@ -18498,7 +18692,9 @@
           <p:txBody>
             <a:bodyPr wrap="square" lIns="0" tIns="0" rIns="0" bIns="0" rtlCol="0"/>
             <a:lstStyle/>
-            <a:p/>
+            <a:p>
+              <a:endParaRPr/>
+            </a:p>
           </p:txBody>
         </p:sp>
         <p:sp>
@@ -18708,7 +18904,9 @@
           <p:txBody>
             <a:bodyPr wrap="square" lIns="0" tIns="0" rIns="0" bIns="0" rtlCol="0"/>
             <a:lstStyle/>
-            <a:p/>
+            <a:p>
+              <a:endParaRPr/>
+            </a:p>
           </p:txBody>
         </p:sp>
         <p:sp>
@@ -18758,7 +18956,9 @@
           <p:txBody>
             <a:bodyPr wrap="square" lIns="0" tIns="0" rIns="0" bIns="0" rtlCol="0"/>
             <a:lstStyle/>
-            <a:p/>
+            <a:p>
+              <a:endParaRPr/>
+            </a:p>
           </p:txBody>
         </p:sp>
         <p:sp>
@@ -18808,7 +19008,9 @@
           <p:txBody>
             <a:bodyPr wrap="square" lIns="0" tIns="0" rIns="0" bIns="0" rtlCol="0"/>
             <a:lstStyle/>
-            <a:p/>
+            <a:p>
+              <a:endParaRPr/>
+            </a:p>
           </p:txBody>
         </p:sp>
         <p:sp>
@@ -19018,7 +19220,9 @@
           <p:txBody>
             <a:bodyPr wrap="square" lIns="0" tIns="0" rIns="0" bIns="0" rtlCol="0"/>
             <a:lstStyle/>
-            <a:p/>
+            <a:p>
+              <a:endParaRPr/>
+            </a:p>
           </p:txBody>
         </p:sp>
       </p:grpSp>
@@ -19119,7 +19323,9 @@
         <p:txBody>
           <a:bodyPr wrap="square" lIns="0" tIns="0" rIns="0" bIns="0" rtlCol="0"/>
           <a:lstStyle/>
-          <a:p/>
+          <a:p>
+            <a:endParaRPr/>
+          </a:p>
         </p:txBody>
       </p:sp>
       <p:sp>
@@ -19254,7 +19460,9 @@
         <p:txBody>
           <a:bodyPr wrap="square" lIns="0" tIns="0" rIns="0" bIns="0" rtlCol="0"/>
           <a:lstStyle/>
-          <a:p/>
+          <a:p>
+            <a:endParaRPr/>
+          </a:p>
         </p:txBody>
       </p:sp>
       <p:sp>
@@ -19270,9 +19478,11 @@
         <p:spPr/>
         <p:txBody>
           <a:bodyPr/>
+          <a:lstStyle/>
           <a:p>
             <a:fld id="{B6F15528-21DE-4FAA-801E-634DDDAF4B2B}" type="slidenum">
               <a:rPr/>
+              <a:t>8</a:t>
             </a:fld>
             <a:endParaRPr/>
           </a:p>
@@ -19310,7 +19520,7 @@
           <p:nvPr/>
         </p:nvPicPr>
         <p:blipFill>
-          <a:blip r:embed="rId1" cstate="print"/>
+          <a:blip r:embed="rId2" cstate="print"/>
           <a:stretch>
             <a:fillRect/>
           </a:stretch>
@@ -19332,7 +19542,7 @@
           <p:nvPr/>
         </p:nvPicPr>
         <p:blipFill>
-          <a:blip r:embed="rId2" cstate="print"/>
+          <a:blip r:embed="rId3" cstate="print"/>
           <a:stretch>
             <a:fillRect/>
           </a:stretch>
@@ -19368,7 +19578,7 @@
             <p:nvPr/>
           </p:nvPicPr>
           <p:blipFill>
-            <a:blip r:embed="rId3" cstate="print"/>
+            <a:blip r:embed="rId4" cstate="print"/>
             <a:stretch>
               <a:fillRect/>
             </a:stretch>
@@ -19390,7 +19600,7 @@
             <p:nvPr/>
           </p:nvPicPr>
           <p:blipFill>
-            <a:blip r:embed="rId4" cstate="print"/>
+            <a:blip r:embed="rId5" cstate="print"/>
             <a:stretch>
               <a:fillRect/>
             </a:stretch>
@@ -19413,28 +19623,6 @@
           <p:nvPr/>
         </p:nvPicPr>
         <p:blipFill>
-          <a:blip r:embed="rId5" cstate="print"/>
-          <a:stretch>
-            <a:fillRect/>
-          </a:stretch>
-        </p:blipFill>
-        <p:spPr>
-          <a:xfrm>
-            <a:off x="6576059" y="4569586"/>
-            <a:ext cx="4873371" cy="304800"/>
-          </a:xfrm>
-          <a:prstGeom prst="rect">
-            <a:avLst/>
-          </a:prstGeom>
-        </p:spPr>
-      </p:pic>
-      <p:pic>
-        <p:nvPicPr>
-          <p:cNvPr id="8" name="object 8"/>
-          <p:cNvPicPr/>
-          <p:nvPr/>
-        </p:nvPicPr>
-        <p:blipFill>
           <a:blip r:embed="rId6" cstate="print"/>
           <a:stretch>
             <a:fillRect/>
@@ -19442,8 +19630,8 @@
         </p:blipFill>
         <p:spPr>
           <a:xfrm>
-            <a:off x="7693406" y="4950586"/>
-            <a:ext cx="2618740" cy="274319"/>
+            <a:off x="6576059" y="4569586"/>
+            <a:ext cx="4873371" cy="304800"/>
           </a:xfrm>
           <a:prstGeom prst="rect">
             <a:avLst/>
@@ -19452,7 +19640,7 @@
       </p:pic>
       <p:pic>
         <p:nvPicPr>
-          <p:cNvPr id="9" name="object 9"/>
+          <p:cNvPr id="8" name="object 8"/>
           <p:cNvPicPr/>
           <p:nvPr/>
         </p:nvPicPr>
@@ -19464,8 +19652,8 @@
         </p:blipFill>
         <p:spPr>
           <a:xfrm>
-            <a:off x="7233157" y="5301360"/>
-            <a:ext cx="3538092" cy="274319"/>
+            <a:off x="7693406" y="4950586"/>
+            <a:ext cx="2618740" cy="274319"/>
           </a:xfrm>
           <a:prstGeom prst="rect">
             <a:avLst/>
@@ -19474,7 +19662,7 @@
       </p:pic>
       <p:pic>
         <p:nvPicPr>
-          <p:cNvPr id="10" name="object 10"/>
+          <p:cNvPr id="9" name="object 9"/>
           <p:cNvPicPr/>
           <p:nvPr/>
         </p:nvPicPr>
@@ -19486,6 +19674,28 @@
         </p:blipFill>
         <p:spPr>
           <a:xfrm>
+            <a:off x="7233157" y="5301360"/>
+            <a:ext cx="3538092" cy="274319"/>
+          </a:xfrm>
+          <a:prstGeom prst="rect">
+            <a:avLst/>
+          </a:prstGeom>
+        </p:spPr>
+      </p:pic>
+      <p:pic>
+        <p:nvPicPr>
+          <p:cNvPr id="10" name="object 10"/>
+          <p:cNvPicPr/>
+          <p:nvPr/>
+        </p:nvPicPr>
+        <p:blipFill>
+          <a:blip r:embed="rId9" cstate="print"/>
+          <a:stretch>
+            <a:fillRect/>
+          </a:stretch>
+        </p:blipFill>
+        <p:spPr>
+          <a:xfrm>
             <a:off x="7765469" y="1867589"/>
             <a:ext cx="2346737" cy="2346737"/>
           </a:xfrm>
@@ -19501,7 +19711,7 @@
           <p:nvPr/>
         </p:nvPicPr>
         <p:blipFill>
-          <a:blip r:embed="rId9" cstate="print"/>
+          <a:blip r:embed="rId10" cstate="print"/>
           <a:stretch>
             <a:fillRect/>
           </a:stretch>
@@ -19529,9 +19739,11 @@
         <p:spPr/>
         <p:txBody>
           <a:bodyPr/>
+          <a:lstStyle/>
           <a:p>
             <a:fld id="{B6F15528-21DE-4FAA-801E-634DDDAF4B2B}" type="slidenum">
               <a:rPr/>
+              <a:t>9</a:t>
             </a:fld>
             <a:endParaRPr/>
           </a:p>
@@ -19823,6 +20035,8 @@
       </a:bgFillStyleLst>
     </a:fmtScheme>
   </a:themeElements>
+  <a:objectDefaults/>
+  <a:extraClrSchemeLst/>
   <a:extLst>
     <a:ext uri="{05A4C25C-085E-4340-85A3-A5531E510DB2}">
       <thm15:themeFamily xmlns:thm15="http://schemas.microsoft.com/office/thememl/2012/main" name="Office Theme" id="{62F939B6-93AF-4DB8-9C6B-D6C7DFDC589F}" vid="{4A3C46E8-61CC-4603-A589-7422A47A8E4A}"/>
@@ -20082,6 +20296,8 @@
       </a:bgFillStyleLst>
     </a:fmtScheme>
   </a:themeElements>
+  <a:objectDefaults/>
+  <a:extraClrSchemeLst/>
   <a:extLst>
     <a:ext uri="{05A4C25C-085E-4340-85A3-A5531E510DB2}">
       <thm15:themeFamily xmlns:thm15="http://schemas.microsoft.com/office/thememl/2012/main" name="Office Theme" id="{62F939B6-93AF-4DB8-9C6B-D6C7DFDC589F}" vid="{4A3C46E8-61CC-4603-A589-7422A47A8E4A}"/>

</xml_diff>